<commit_message>
Remove obsolete diagrams; tweak 2f
</commit_message>
<xml_diff>
--- a/paper_figures/sbolvisual/17 Combinations.pptx
+++ b/paper_figures/sbolvisual/17 Combinations.pptx
@@ -259,7 +259,7 @@
           <a:p>
             <a:fld id="{E0738109-6F55-4873-A4BF-B04FD27AEE0D}" type="datetimeFigureOut">
               <a:rPr lang="en-US" smtClean="0"/>
-              <a:t>11/30/21</a:t>
+              <a:t>2/18/22</a:t>
             </a:fld>
             <a:endParaRPr lang="en-US"/>
           </a:p>
@@ -427,7 +427,7 @@
           <a:p>
             <a:fld id="{E0738109-6F55-4873-A4BF-B04FD27AEE0D}" type="datetimeFigureOut">
               <a:rPr lang="en-US" smtClean="0"/>
-              <a:t>11/30/21</a:t>
+              <a:t>2/18/22</a:t>
             </a:fld>
             <a:endParaRPr lang="en-US"/>
           </a:p>
@@ -605,7 +605,7 @@
           <a:p>
             <a:fld id="{E0738109-6F55-4873-A4BF-B04FD27AEE0D}" type="datetimeFigureOut">
               <a:rPr lang="en-US" smtClean="0"/>
-              <a:t>11/30/21</a:t>
+              <a:t>2/18/22</a:t>
             </a:fld>
             <a:endParaRPr lang="en-US"/>
           </a:p>
@@ -773,7 +773,7 @@
           <a:p>
             <a:fld id="{E0738109-6F55-4873-A4BF-B04FD27AEE0D}" type="datetimeFigureOut">
               <a:rPr lang="en-US" smtClean="0"/>
-              <a:t>11/30/21</a:t>
+              <a:t>2/18/22</a:t>
             </a:fld>
             <a:endParaRPr lang="en-US"/>
           </a:p>
@@ -1018,7 +1018,7 @@
           <a:p>
             <a:fld id="{E0738109-6F55-4873-A4BF-B04FD27AEE0D}" type="datetimeFigureOut">
               <a:rPr lang="en-US" smtClean="0"/>
-              <a:t>11/30/21</a:t>
+              <a:t>2/18/22</a:t>
             </a:fld>
             <a:endParaRPr lang="en-US"/>
           </a:p>
@@ -1247,7 +1247,7 @@
           <a:p>
             <a:fld id="{E0738109-6F55-4873-A4BF-B04FD27AEE0D}" type="datetimeFigureOut">
               <a:rPr lang="en-US" smtClean="0"/>
-              <a:t>11/30/21</a:t>
+              <a:t>2/18/22</a:t>
             </a:fld>
             <a:endParaRPr lang="en-US"/>
           </a:p>
@@ -1611,7 +1611,7 @@
           <a:p>
             <a:fld id="{E0738109-6F55-4873-A4BF-B04FD27AEE0D}" type="datetimeFigureOut">
               <a:rPr lang="en-US" smtClean="0"/>
-              <a:t>11/30/21</a:t>
+              <a:t>2/18/22</a:t>
             </a:fld>
             <a:endParaRPr lang="en-US"/>
           </a:p>
@@ -1728,7 +1728,7 @@
           <a:p>
             <a:fld id="{E0738109-6F55-4873-A4BF-B04FD27AEE0D}" type="datetimeFigureOut">
               <a:rPr lang="en-US" smtClean="0"/>
-              <a:t>11/30/21</a:t>
+              <a:t>2/18/22</a:t>
             </a:fld>
             <a:endParaRPr lang="en-US"/>
           </a:p>
@@ -1823,7 +1823,7 @@
           <a:p>
             <a:fld id="{E0738109-6F55-4873-A4BF-B04FD27AEE0D}" type="datetimeFigureOut">
               <a:rPr lang="en-US" smtClean="0"/>
-              <a:t>11/30/21</a:t>
+              <a:t>2/18/22</a:t>
             </a:fld>
             <a:endParaRPr lang="en-US"/>
           </a:p>
@@ -2098,7 +2098,7 @@
           <a:p>
             <a:fld id="{E0738109-6F55-4873-A4BF-B04FD27AEE0D}" type="datetimeFigureOut">
               <a:rPr lang="en-US" smtClean="0"/>
-              <a:t>11/30/21</a:t>
+              <a:t>2/18/22</a:t>
             </a:fld>
             <a:endParaRPr lang="en-US"/>
           </a:p>
@@ -2350,7 +2350,7 @@
           <a:p>
             <a:fld id="{E0738109-6F55-4873-A4BF-B04FD27AEE0D}" type="datetimeFigureOut">
               <a:rPr lang="en-US" smtClean="0"/>
-              <a:t>11/30/21</a:t>
+              <a:t>2/18/22</a:t>
             </a:fld>
             <a:endParaRPr lang="en-US"/>
           </a:p>
@@ -2561,7 +2561,7 @@
           <a:p>
             <a:fld id="{E0738109-6F55-4873-A4BF-B04FD27AEE0D}" type="datetimeFigureOut">
               <a:rPr lang="en-US" smtClean="0"/>
-              <a:t>11/30/21</a:t>
+              <a:t>2/18/22</a:t>
             </a:fld>
             <a:endParaRPr lang="en-US"/>
           </a:p>
@@ -18980,277 +18980,6 @@
           </a:p>
         </p:txBody>
       </p:sp>
-      <p:grpSp>
-        <p:nvGrpSpPr>
-          <p:cNvPr id="3" name="Group 2">
-            <a:extLst>
-              <a:ext uri="{FF2B5EF4-FFF2-40B4-BE49-F238E27FC236}">
-                <a16:creationId xmlns:a16="http://schemas.microsoft.com/office/drawing/2014/main" id="{95DEA15C-E72E-1948-BB30-6A1416C5C8AA}"/>
-              </a:ext>
-            </a:extLst>
-          </p:cNvPr>
-          <p:cNvGrpSpPr/>
-          <p:nvPr/>
-        </p:nvGrpSpPr>
-        <p:grpSpPr>
-          <a:xfrm>
-            <a:off x="5518662" y="3787396"/>
-            <a:ext cx="484281" cy="172854"/>
-            <a:chOff x="5293558" y="3697843"/>
-            <a:chExt cx="660058" cy="235594"/>
-          </a:xfrm>
-        </p:grpSpPr>
-        <p:sp>
-          <p:nvSpPr>
-            <p:cNvPr id="4" name="Freeform 3">
-              <a:extLst>
-                <a:ext uri="{FF2B5EF4-FFF2-40B4-BE49-F238E27FC236}">
-                  <a16:creationId xmlns:a16="http://schemas.microsoft.com/office/drawing/2014/main" id="{75AD57A3-7EE3-194B-B2D3-1B6867E8F69D}"/>
-                </a:ext>
-              </a:extLst>
-            </p:cNvPr>
-            <p:cNvSpPr/>
-            <p:nvPr/>
-          </p:nvSpPr>
-          <p:spPr>
-            <a:xfrm>
-              <a:off x="5293558" y="3697843"/>
-              <a:ext cx="660058" cy="108654"/>
-            </a:xfrm>
-            <a:custGeom>
-              <a:avLst/>
-              <a:gdLst>
-                <a:gd name="connsiteX0" fmla="*/ 0 w 7331149"/>
-                <a:gd name="connsiteY0" fmla="*/ 1206795 h 1206795"/>
-                <a:gd name="connsiteX1" fmla="*/ 1217428 w 7331149"/>
-                <a:gd name="connsiteY1" fmla="*/ 0 h 1206795"/>
-                <a:gd name="connsiteX2" fmla="*/ 2434856 w 7331149"/>
-                <a:gd name="connsiteY2" fmla="*/ 1201479 h 1206795"/>
-                <a:gd name="connsiteX3" fmla="*/ 3657600 w 7331149"/>
-                <a:gd name="connsiteY3" fmla="*/ 0 h 1206795"/>
-                <a:gd name="connsiteX4" fmla="*/ 4890977 w 7331149"/>
-                <a:gd name="connsiteY4" fmla="*/ 1206795 h 1206795"/>
-                <a:gd name="connsiteX5" fmla="*/ 6087140 w 7331149"/>
-                <a:gd name="connsiteY5" fmla="*/ 0 h 1206795"/>
-                <a:gd name="connsiteX6" fmla="*/ 7331149 w 7331149"/>
-                <a:gd name="connsiteY6" fmla="*/ 1201479 h 1206795"/>
-              </a:gdLst>
-              <a:ahLst/>
-              <a:cxnLst>
-                <a:cxn ang="0">
-                  <a:pos x="connsiteX0" y="connsiteY0"/>
-                </a:cxn>
-                <a:cxn ang="0">
-                  <a:pos x="connsiteX1" y="connsiteY1"/>
-                </a:cxn>
-                <a:cxn ang="0">
-                  <a:pos x="connsiteX2" y="connsiteY2"/>
-                </a:cxn>
-                <a:cxn ang="0">
-                  <a:pos x="connsiteX3" y="connsiteY3"/>
-                </a:cxn>
-                <a:cxn ang="0">
-                  <a:pos x="connsiteX4" y="connsiteY4"/>
-                </a:cxn>
-                <a:cxn ang="0">
-                  <a:pos x="connsiteX5" y="connsiteY5"/>
-                </a:cxn>
-                <a:cxn ang="0">
-                  <a:pos x="connsiteX6" y="connsiteY6"/>
-                </a:cxn>
-              </a:cxnLst>
-              <a:rect l="l" t="t" r="r" b="b"/>
-              <a:pathLst>
-                <a:path w="7331149" h="1206795">
-                  <a:moveTo>
-                    <a:pt x="0" y="1206795"/>
-                  </a:moveTo>
-                  <a:cubicBezTo>
-                    <a:pt x="405809" y="603840"/>
-                    <a:pt x="811619" y="886"/>
-                    <a:pt x="1217428" y="0"/>
-                  </a:cubicBezTo>
-                  <a:cubicBezTo>
-                    <a:pt x="1623237" y="-886"/>
-                    <a:pt x="2028161" y="1201479"/>
-                    <a:pt x="2434856" y="1201479"/>
-                  </a:cubicBezTo>
-                  <a:cubicBezTo>
-                    <a:pt x="2841551" y="1201479"/>
-                    <a:pt x="3248247" y="-886"/>
-                    <a:pt x="3657600" y="0"/>
-                  </a:cubicBezTo>
-                  <a:cubicBezTo>
-                    <a:pt x="4066954" y="886"/>
-                    <a:pt x="4486054" y="1206795"/>
-                    <a:pt x="4890977" y="1206795"/>
-                  </a:cubicBezTo>
-                  <a:cubicBezTo>
-                    <a:pt x="5295900" y="1206795"/>
-                    <a:pt x="5680445" y="886"/>
-                    <a:pt x="6087140" y="0"/>
-                  </a:cubicBezTo>
-                  <a:cubicBezTo>
-                    <a:pt x="6493835" y="-886"/>
-                    <a:pt x="6912492" y="600296"/>
-                    <a:pt x="7331149" y="1201479"/>
-                  </a:cubicBezTo>
-                </a:path>
-              </a:pathLst>
-            </a:custGeom>
-            <a:ln w="28575">
-              <a:solidFill>
-                <a:srgbClr val="C00000"/>
-              </a:solidFill>
-            </a:ln>
-          </p:spPr>
-          <p:style>
-            <a:lnRef idx="1">
-              <a:schemeClr val="dk1"/>
-            </a:lnRef>
-            <a:fillRef idx="0">
-              <a:schemeClr val="dk1"/>
-            </a:fillRef>
-            <a:effectRef idx="0">
-              <a:schemeClr val="dk1"/>
-            </a:effectRef>
-            <a:fontRef idx="minor">
-              <a:schemeClr val="tx1"/>
-            </a:fontRef>
-          </p:style>
-          <p:txBody>
-            <a:bodyPr rtlCol="0" anchor="ctr"/>
-            <a:lstStyle/>
-            <a:p>
-              <a:pPr algn="ctr"/>
-              <a:endParaRPr lang="en-US"/>
-            </a:p>
-          </p:txBody>
-        </p:sp>
-        <p:cxnSp>
-          <p:nvCxnSpPr>
-            <p:cNvPr id="5" name="Straight Connector 4">
-              <a:extLst>
-                <a:ext uri="{FF2B5EF4-FFF2-40B4-BE49-F238E27FC236}">
-                  <a16:creationId xmlns:a16="http://schemas.microsoft.com/office/drawing/2014/main" id="{79D5EFDC-BA9A-164D-9ED8-663D3C519152}"/>
-                </a:ext>
-              </a:extLst>
-            </p:cNvPr>
-            <p:cNvCxnSpPr/>
-            <p:nvPr/>
-          </p:nvCxnSpPr>
-          <p:spPr>
-            <a:xfrm flipH="1">
-              <a:off x="5293558" y="3796278"/>
-              <a:ext cx="1588" cy="137159"/>
-            </a:xfrm>
-            <a:prstGeom prst="line">
-              <a:avLst/>
-            </a:prstGeom>
-            <a:ln w="28575">
-              <a:solidFill>
-                <a:srgbClr val="C00000"/>
-              </a:solidFill>
-            </a:ln>
-          </p:spPr>
-          <p:style>
-            <a:lnRef idx="1">
-              <a:schemeClr val="dk1"/>
-            </a:lnRef>
-            <a:fillRef idx="0">
-              <a:schemeClr val="dk1"/>
-            </a:fillRef>
-            <a:effectRef idx="0">
-              <a:schemeClr val="dk1"/>
-            </a:effectRef>
-            <a:fontRef idx="minor">
-              <a:schemeClr val="tx1"/>
-            </a:fontRef>
-          </p:style>
-        </p:cxnSp>
-        <p:cxnSp>
-          <p:nvCxnSpPr>
-            <p:cNvPr id="6" name="Straight Connector 5">
-              <a:extLst>
-                <a:ext uri="{FF2B5EF4-FFF2-40B4-BE49-F238E27FC236}">
-                  <a16:creationId xmlns:a16="http://schemas.microsoft.com/office/drawing/2014/main" id="{3F7BE500-7356-0E4E-B1B8-3C01E2864E48}"/>
-                </a:ext>
-              </a:extLst>
-            </p:cNvPr>
-            <p:cNvCxnSpPr/>
-            <p:nvPr/>
-          </p:nvCxnSpPr>
-          <p:spPr>
-            <a:xfrm flipV="1">
-              <a:off x="5293558" y="3912780"/>
-              <a:ext cx="659826" cy="2238"/>
-            </a:xfrm>
-            <a:prstGeom prst="line">
-              <a:avLst/>
-            </a:prstGeom>
-            <a:ln w="28575">
-              <a:solidFill>
-                <a:srgbClr val="C00000"/>
-              </a:solidFill>
-            </a:ln>
-          </p:spPr>
-          <p:style>
-            <a:lnRef idx="1">
-              <a:schemeClr val="dk1"/>
-            </a:lnRef>
-            <a:fillRef idx="0">
-              <a:schemeClr val="dk1"/>
-            </a:fillRef>
-            <a:effectRef idx="0">
-              <a:schemeClr val="dk1"/>
-            </a:effectRef>
-            <a:fontRef idx="minor">
-              <a:schemeClr val="tx1"/>
-            </a:fontRef>
-          </p:style>
-        </p:cxnSp>
-        <p:cxnSp>
-          <p:nvCxnSpPr>
-            <p:cNvPr id="7" name="Straight Connector 6">
-              <a:extLst>
-                <a:ext uri="{FF2B5EF4-FFF2-40B4-BE49-F238E27FC236}">
-                  <a16:creationId xmlns:a16="http://schemas.microsoft.com/office/drawing/2014/main" id="{C33904FE-637B-BE45-8600-C9C22BE8B7D3}"/>
-                </a:ext>
-              </a:extLst>
-            </p:cNvPr>
-            <p:cNvCxnSpPr/>
-            <p:nvPr/>
-          </p:nvCxnSpPr>
-          <p:spPr>
-            <a:xfrm flipH="1">
-              <a:off x="5948620" y="3794477"/>
-              <a:ext cx="1588" cy="137160"/>
-            </a:xfrm>
-            <a:prstGeom prst="line">
-              <a:avLst/>
-            </a:prstGeom>
-            <a:ln w="28575">
-              <a:solidFill>
-                <a:srgbClr val="C00000"/>
-              </a:solidFill>
-            </a:ln>
-          </p:spPr>
-          <p:style>
-            <a:lnRef idx="1">
-              <a:schemeClr val="dk1"/>
-            </a:lnRef>
-            <a:fillRef idx="0">
-              <a:schemeClr val="dk1"/>
-            </a:fillRef>
-            <a:effectRef idx="0">
-              <a:schemeClr val="dk1"/>
-            </a:effectRef>
-            <a:fontRef idx="minor">
-              <a:schemeClr val="tx1"/>
-            </a:fontRef>
-          </p:style>
-        </p:cxnSp>
-      </p:grpSp>
       <p:cxnSp>
         <p:nvCxnSpPr>
           <p:cNvPr id="8" name="Straight Arrow Connector 7">
@@ -20991,12 +20720,92 @@
           </a:fontRef>
         </p:style>
       </p:cxnSp>
+      <p:cxnSp>
+        <p:nvCxnSpPr>
+          <p:cNvPr id="45" name="Straight Arrow Connector 44">
+            <a:extLst>
+              <a:ext uri="{FF2B5EF4-FFF2-40B4-BE49-F238E27FC236}">
+                <a16:creationId xmlns:a16="http://schemas.microsoft.com/office/drawing/2014/main" id="{B56A71EF-E6C7-C345-B5AB-722255EFEB05}"/>
+              </a:ext>
+            </a:extLst>
+          </p:cNvPr>
+          <p:cNvCxnSpPr/>
+          <p:nvPr/>
+        </p:nvCxnSpPr>
+        <p:spPr>
+          <a:xfrm>
+            <a:off x="5781409" y="2581442"/>
+            <a:ext cx="217762" cy="0"/>
+          </a:xfrm>
+          <a:prstGeom prst="straightConnector1">
+            <a:avLst/>
+          </a:prstGeom>
+          <a:ln w="25400">
+            <a:tailEnd type="triangle" w="lg" len="lg"/>
+          </a:ln>
+        </p:spPr>
+        <p:style>
+          <a:lnRef idx="1">
+            <a:schemeClr val="accent3"/>
+          </a:lnRef>
+          <a:fillRef idx="0">
+            <a:schemeClr val="accent3"/>
+          </a:fillRef>
+          <a:effectRef idx="0">
+            <a:schemeClr val="accent3"/>
+          </a:effectRef>
+          <a:fontRef idx="minor">
+            <a:schemeClr val="tx1"/>
+          </a:fontRef>
+        </p:style>
+      </p:cxnSp>
+      <p:cxnSp>
+        <p:nvCxnSpPr>
+          <p:cNvPr id="46" name="Straight Connector 45">
+            <a:extLst>
+              <a:ext uri="{FF2B5EF4-FFF2-40B4-BE49-F238E27FC236}">
+                <a16:creationId xmlns:a16="http://schemas.microsoft.com/office/drawing/2014/main" id="{0CF36E52-5C46-434F-BFAC-AB6811D04E4E}"/>
+              </a:ext>
+            </a:extLst>
+          </p:cNvPr>
+          <p:cNvCxnSpPr/>
+          <p:nvPr/>
+        </p:nvCxnSpPr>
+        <p:spPr>
+          <a:xfrm>
+            <a:off x="6742125" y="2573663"/>
+            <a:ext cx="1060704" cy="0"/>
+          </a:xfrm>
+          <a:prstGeom prst="line">
+            <a:avLst/>
+          </a:prstGeom>
+          <a:ln w="25400">
+            <a:solidFill>
+              <a:srgbClr val="C00000"/>
+            </a:solidFill>
+          </a:ln>
+        </p:spPr>
+        <p:style>
+          <a:lnRef idx="1">
+            <a:schemeClr val="accent3"/>
+          </a:lnRef>
+          <a:fillRef idx="0">
+            <a:schemeClr val="accent3"/>
+          </a:fillRef>
+          <a:effectRef idx="0">
+            <a:schemeClr val="accent3"/>
+          </a:effectRef>
+          <a:fontRef idx="minor">
+            <a:schemeClr val="tx1"/>
+          </a:fontRef>
+        </p:style>
+      </p:cxnSp>
       <p:sp>
         <p:nvSpPr>
-          <p:cNvPr id="41" name="Isosceles Triangle 38">
-            <a:extLst>
-              <a:ext uri="{FF2B5EF4-FFF2-40B4-BE49-F238E27FC236}">
-                <a16:creationId xmlns:a16="http://schemas.microsoft.com/office/drawing/2014/main" id="{B856E018-378F-D144-82EA-BC46341585E8}"/>
+          <p:cNvPr id="48" name="Rounded Rectangle 47">
+            <a:extLst>
+              <a:ext uri="{FF2B5EF4-FFF2-40B4-BE49-F238E27FC236}">
+                <a16:creationId xmlns:a16="http://schemas.microsoft.com/office/drawing/2014/main" id="{9524DE2A-7CE0-4843-AC76-97529532D02A}"/>
               </a:ext>
             </a:extLst>
           </p:cNvPr>
@@ -21004,13 +20813,21 @@
           <p:nvPr/>
         </p:nvSpPr>
         <p:spPr>
-          <a:xfrm rot="5400000">
-            <a:off x="4600813" y="3838370"/>
-            <a:ext cx="209543" cy="208423"/>
-          </a:xfrm>
-          <a:prstGeom prst="triangle">
-            <a:avLst/>
-          </a:prstGeom>
+          <a:xfrm>
+            <a:off x="6007264" y="2461828"/>
+            <a:ext cx="612967" cy="255371"/>
+          </a:xfrm>
+          <a:prstGeom prst="roundRect">
+            <a:avLst>
+              <a:gd name="adj" fmla="val 50000"/>
+            </a:avLst>
+          </a:prstGeom>
+          <a:solidFill>
+            <a:schemeClr val="accent1">
+              <a:lumMod val="40000"/>
+              <a:lumOff val="60000"/>
+            </a:schemeClr>
+          </a:solidFill>
         </p:spPr>
         <p:style>
           <a:lnRef idx="2">
@@ -21039,10 +20856,10 @@
       </p:sp>
       <p:sp>
         <p:nvSpPr>
-          <p:cNvPr id="42" name="Isosceles Triangle 39">
-            <a:extLst>
-              <a:ext uri="{FF2B5EF4-FFF2-40B4-BE49-F238E27FC236}">
-                <a16:creationId xmlns:a16="http://schemas.microsoft.com/office/drawing/2014/main" id="{DA52B8F0-EA12-664B-8967-DD6A3573AC09}"/>
+          <p:cNvPr id="49" name="Freeform 48">
+            <a:extLst>
+              <a:ext uri="{FF2B5EF4-FFF2-40B4-BE49-F238E27FC236}">
+                <a16:creationId xmlns:a16="http://schemas.microsoft.com/office/drawing/2014/main" id="{546205D1-2995-AF42-A4A1-E30F86766151}"/>
               </a:ext>
             </a:extLst>
           </p:cNvPr>
@@ -21050,214 +20867,8 @@
           <p:nvPr/>
         </p:nvSpPr>
         <p:spPr>
-          <a:xfrm rot="5400000">
-            <a:off x="5239827" y="3833116"/>
-            <a:ext cx="209543" cy="208423"/>
-          </a:xfrm>
-          <a:prstGeom prst="triangle">
-            <a:avLst/>
-          </a:prstGeom>
-        </p:spPr>
-        <p:style>
-          <a:lnRef idx="2">
-            <a:schemeClr val="accent1">
-              <a:shade val="50000"/>
-            </a:schemeClr>
-          </a:lnRef>
-          <a:fillRef idx="1">
-            <a:schemeClr val="accent1"/>
-          </a:fillRef>
-          <a:effectRef idx="0">
-            <a:schemeClr val="accent1"/>
-          </a:effectRef>
-          <a:fontRef idx="minor">
-            <a:schemeClr val="lt1"/>
-          </a:fontRef>
-        </p:style>
-        <p:txBody>
-          <a:bodyPr rtlCol="0" anchor="ctr"/>
-          <a:lstStyle/>
-          <a:p>
-            <a:pPr algn="ctr"/>
-            <a:endParaRPr lang="en-US"/>
-          </a:p>
-        </p:txBody>
-      </p:sp>
-      <p:cxnSp>
-        <p:nvCxnSpPr>
-          <p:cNvPr id="43" name="Straight Arrow Connector 42">
-            <a:extLst>
-              <a:ext uri="{FF2B5EF4-FFF2-40B4-BE49-F238E27FC236}">
-                <a16:creationId xmlns:a16="http://schemas.microsoft.com/office/drawing/2014/main" id="{7EA374A8-B0D0-CC4E-B750-F361ABC5F27B}"/>
-              </a:ext>
-            </a:extLst>
-          </p:cNvPr>
-          <p:cNvCxnSpPr/>
-          <p:nvPr/>
-        </p:nvCxnSpPr>
-        <p:spPr>
-          <a:xfrm flipV="1">
-            <a:off x="5769610" y="3341424"/>
-            <a:ext cx="2637" cy="439764"/>
-          </a:xfrm>
-          <a:prstGeom prst="straightConnector1">
-            <a:avLst/>
-          </a:prstGeom>
-          <a:ln w="25400">
-            <a:tailEnd type="triangle" w="lg" len="lg"/>
-          </a:ln>
-        </p:spPr>
-        <p:style>
-          <a:lnRef idx="1">
-            <a:schemeClr val="accent3"/>
-          </a:lnRef>
-          <a:fillRef idx="0">
-            <a:schemeClr val="accent3"/>
-          </a:fillRef>
-          <a:effectRef idx="0">
-            <a:schemeClr val="accent3"/>
-          </a:effectRef>
-          <a:fontRef idx="minor">
-            <a:schemeClr val="tx1"/>
-          </a:fontRef>
-        </p:style>
-      </p:cxnSp>
-      <p:cxnSp>
-        <p:nvCxnSpPr>
-          <p:cNvPr id="44" name="Straight Connector 43">
-            <a:extLst>
-              <a:ext uri="{FF2B5EF4-FFF2-40B4-BE49-F238E27FC236}">
-                <a16:creationId xmlns:a16="http://schemas.microsoft.com/office/drawing/2014/main" id="{821488D2-9017-3F4E-8EE7-F9FA29E1454E}"/>
-              </a:ext>
-            </a:extLst>
-          </p:cNvPr>
-          <p:cNvCxnSpPr>
-            <a:cxnSpLocks/>
-            <a:stCxn id="47" idx="4"/>
-            <a:endCxn id="50" idx="4"/>
-          </p:cNvCxnSpPr>
-          <p:nvPr/>
-        </p:nvCxnSpPr>
-        <p:spPr>
-          <a:xfrm flipH="1" flipV="1">
-            <a:off x="5777440" y="2627696"/>
-            <a:ext cx="0" cy="601311"/>
-          </a:xfrm>
-          <a:prstGeom prst="line">
-            <a:avLst/>
-          </a:prstGeom>
-          <a:ln w="25400"/>
-        </p:spPr>
-        <p:style>
-          <a:lnRef idx="1">
-            <a:schemeClr val="accent3"/>
-          </a:lnRef>
-          <a:fillRef idx="0">
-            <a:schemeClr val="accent3"/>
-          </a:fillRef>
-          <a:effectRef idx="0">
-            <a:schemeClr val="accent3"/>
-          </a:effectRef>
-          <a:fontRef idx="minor">
-            <a:schemeClr val="tx1"/>
-          </a:fontRef>
-        </p:style>
-      </p:cxnSp>
-      <p:cxnSp>
-        <p:nvCxnSpPr>
-          <p:cNvPr id="45" name="Straight Arrow Connector 44">
-            <a:extLst>
-              <a:ext uri="{FF2B5EF4-FFF2-40B4-BE49-F238E27FC236}">
-                <a16:creationId xmlns:a16="http://schemas.microsoft.com/office/drawing/2014/main" id="{B56A71EF-E6C7-C345-B5AB-722255EFEB05}"/>
-              </a:ext>
-            </a:extLst>
-          </p:cNvPr>
-          <p:cNvCxnSpPr/>
-          <p:nvPr/>
-        </p:nvCxnSpPr>
-        <p:spPr>
           <a:xfrm>
-            <a:off x="5781409" y="2581442"/>
-            <a:ext cx="217762" cy="0"/>
-          </a:xfrm>
-          <a:prstGeom prst="straightConnector1">
-            <a:avLst/>
-          </a:prstGeom>
-          <a:ln w="25400">
-            <a:tailEnd type="triangle" w="lg" len="lg"/>
-          </a:ln>
-        </p:spPr>
-        <p:style>
-          <a:lnRef idx="1">
-            <a:schemeClr val="accent3"/>
-          </a:lnRef>
-          <a:fillRef idx="0">
-            <a:schemeClr val="accent3"/>
-          </a:fillRef>
-          <a:effectRef idx="0">
-            <a:schemeClr val="accent3"/>
-          </a:effectRef>
-          <a:fontRef idx="minor">
-            <a:schemeClr val="tx1"/>
-          </a:fontRef>
-        </p:style>
-      </p:cxnSp>
-      <p:cxnSp>
-        <p:nvCxnSpPr>
-          <p:cNvPr id="46" name="Straight Connector 45">
-            <a:extLst>
-              <a:ext uri="{FF2B5EF4-FFF2-40B4-BE49-F238E27FC236}">
-                <a16:creationId xmlns:a16="http://schemas.microsoft.com/office/drawing/2014/main" id="{0CF36E52-5C46-434F-BFAC-AB6811D04E4E}"/>
-              </a:ext>
-            </a:extLst>
-          </p:cNvPr>
-          <p:cNvCxnSpPr/>
-          <p:nvPr/>
-        </p:nvCxnSpPr>
-        <p:spPr>
-          <a:xfrm>
-            <a:off x="6742125" y="2573663"/>
-            <a:ext cx="1060704" cy="0"/>
-          </a:xfrm>
-          <a:prstGeom prst="line">
-            <a:avLst/>
-          </a:prstGeom>
-          <a:ln w="25400">
-            <a:solidFill>
-              <a:srgbClr val="C00000"/>
-            </a:solidFill>
-          </a:ln>
-        </p:spPr>
-        <p:style>
-          <a:lnRef idx="1">
-            <a:schemeClr val="accent3"/>
-          </a:lnRef>
-          <a:fillRef idx="0">
-            <a:schemeClr val="accent3"/>
-          </a:fillRef>
-          <a:effectRef idx="0">
-            <a:schemeClr val="accent3"/>
-          </a:effectRef>
-          <a:fontRef idx="minor">
-            <a:schemeClr val="tx1"/>
-          </a:fontRef>
-        </p:style>
-      </p:cxnSp>
-      <p:sp>
-        <p:nvSpPr>
-          <p:cNvPr id="47" name="Freeform 46">
-            <a:extLst>
-              <a:ext uri="{FF2B5EF4-FFF2-40B4-BE49-F238E27FC236}">
-                <a16:creationId xmlns:a16="http://schemas.microsoft.com/office/drawing/2014/main" id="{7C89FA2D-FA1E-B74E-9759-49FA16AFD8F3}"/>
-              </a:ext>
-            </a:extLst>
-          </p:cNvPr>
-          <p:cNvSpPr/>
-          <p:nvPr/>
-        </p:nvSpPr>
-        <p:spPr>
-          <a:xfrm>
-            <a:off x="5495735" y="3228059"/>
+            <a:off x="6160929" y="2547956"/>
             <a:ext cx="571347" cy="83114"/>
           </a:xfrm>
           <a:custGeom>
@@ -21390,12 +21001,363 @@
           </a:p>
         </p:txBody>
       </p:sp>
+      <p:grpSp>
+        <p:nvGrpSpPr>
+          <p:cNvPr id="3" name="Group 2">
+            <a:extLst>
+              <a:ext uri="{FF2B5EF4-FFF2-40B4-BE49-F238E27FC236}">
+                <a16:creationId xmlns:a16="http://schemas.microsoft.com/office/drawing/2014/main" id="{95DEA15C-E72E-1948-BB30-6A1416C5C8AA}"/>
+              </a:ext>
+            </a:extLst>
+          </p:cNvPr>
+          <p:cNvGrpSpPr/>
+          <p:nvPr/>
+        </p:nvGrpSpPr>
+        <p:grpSpPr>
+          <a:xfrm>
+            <a:off x="5518662" y="3787396"/>
+            <a:ext cx="484281" cy="172854"/>
+            <a:chOff x="5293558" y="3697843"/>
+            <a:chExt cx="660058" cy="235594"/>
+          </a:xfrm>
+        </p:grpSpPr>
+        <p:sp>
+          <p:nvSpPr>
+            <p:cNvPr id="4" name="Freeform 3">
+              <a:extLst>
+                <a:ext uri="{FF2B5EF4-FFF2-40B4-BE49-F238E27FC236}">
+                  <a16:creationId xmlns:a16="http://schemas.microsoft.com/office/drawing/2014/main" id="{75AD57A3-7EE3-194B-B2D3-1B6867E8F69D}"/>
+                </a:ext>
+              </a:extLst>
+            </p:cNvPr>
+            <p:cNvSpPr/>
+            <p:nvPr/>
+          </p:nvSpPr>
+          <p:spPr>
+            <a:xfrm>
+              <a:off x="5293558" y="3697843"/>
+              <a:ext cx="660058" cy="108654"/>
+            </a:xfrm>
+            <a:custGeom>
+              <a:avLst/>
+              <a:gdLst>
+                <a:gd name="connsiteX0" fmla="*/ 0 w 7331149"/>
+                <a:gd name="connsiteY0" fmla="*/ 1206795 h 1206795"/>
+                <a:gd name="connsiteX1" fmla="*/ 1217428 w 7331149"/>
+                <a:gd name="connsiteY1" fmla="*/ 0 h 1206795"/>
+                <a:gd name="connsiteX2" fmla="*/ 2434856 w 7331149"/>
+                <a:gd name="connsiteY2" fmla="*/ 1201479 h 1206795"/>
+                <a:gd name="connsiteX3" fmla="*/ 3657600 w 7331149"/>
+                <a:gd name="connsiteY3" fmla="*/ 0 h 1206795"/>
+                <a:gd name="connsiteX4" fmla="*/ 4890977 w 7331149"/>
+                <a:gd name="connsiteY4" fmla="*/ 1206795 h 1206795"/>
+                <a:gd name="connsiteX5" fmla="*/ 6087140 w 7331149"/>
+                <a:gd name="connsiteY5" fmla="*/ 0 h 1206795"/>
+                <a:gd name="connsiteX6" fmla="*/ 7331149 w 7331149"/>
+                <a:gd name="connsiteY6" fmla="*/ 1201479 h 1206795"/>
+              </a:gdLst>
+              <a:ahLst/>
+              <a:cxnLst>
+                <a:cxn ang="0">
+                  <a:pos x="connsiteX0" y="connsiteY0"/>
+                </a:cxn>
+                <a:cxn ang="0">
+                  <a:pos x="connsiteX1" y="connsiteY1"/>
+                </a:cxn>
+                <a:cxn ang="0">
+                  <a:pos x="connsiteX2" y="connsiteY2"/>
+                </a:cxn>
+                <a:cxn ang="0">
+                  <a:pos x="connsiteX3" y="connsiteY3"/>
+                </a:cxn>
+                <a:cxn ang="0">
+                  <a:pos x="connsiteX4" y="connsiteY4"/>
+                </a:cxn>
+                <a:cxn ang="0">
+                  <a:pos x="connsiteX5" y="connsiteY5"/>
+                </a:cxn>
+                <a:cxn ang="0">
+                  <a:pos x="connsiteX6" y="connsiteY6"/>
+                </a:cxn>
+              </a:cxnLst>
+              <a:rect l="l" t="t" r="r" b="b"/>
+              <a:pathLst>
+                <a:path w="7331149" h="1206795">
+                  <a:moveTo>
+                    <a:pt x="0" y="1206795"/>
+                  </a:moveTo>
+                  <a:cubicBezTo>
+                    <a:pt x="405809" y="603840"/>
+                    <a:pt x="811619" y="886"/>
+                    <a:pt x="1217428" y="0"/>
+                  </a:cubicBezTo>
+                  <a:cubicBezTo>
+                    <a:pt x="1623237" y="-886"/>
+                    <a:pt x="2028161" y="1201479"/>
+                    <a:pt x="2434856" y="1201479"/>
+                  </a:cubicBezTo>
+                  <a:cubicBezTo>
+                    <a:pt x="2841551" y="1201479"/>
+                    <a:pt x="3248247" y="-886"/>
+                    <a:pt x="3657600" y="0"/>
+                  </a:cubicBezTo>
+                  <a:cubicBezTo>
+                    <a:pt x="4066954" y="886"/>
+                    <a:pt x="4486054" y="1206795"/>
+                    <a:pt x="4890977" y="1206795"/>
+                  </a:cubicBezTo>
+                  <a:cubicBezTo>
+                    <a:pt x="5295900" y="1206795"/>
+                    <a:pt x="5680445" y="886"/>
+                    <a:pt x="6087140" y="0"/>
+                  </a:cubicBezTo>
+                  <a:cubicBezTo>
+                    <a:pt x="6493835" y="-886"/>
+                    <a:pt x="6912492" y="600296"/>
+                    <a:pt x="7331149" y="1201479"/>
+                  </a:cubicBezTo>
+                </a:path>
+              </a:pathLst>
+            </a:custGeom>
+            <a:ln w="28575">
+              <a:solidFill>
+                <a:srgbClr val="C00000"/>
+              </a:solidFill>
+            </a:ln>
+          </p:spPr>
+          <p:style>
+            <a:lnRef idx="1">
+              <a:schemeClr val="dk1"/>
+            </a:lnRef>
+            <a:fillRef idx="0">
+              <a:schemeClr val="dk1"/>
+            </a:fillRef>
+            <a:effectRef idx="0">
+              <a:schemeClr val="dk1"/>
+            </a:effectRef>
+            <a:fontRef idx="minor">
+              <a:schemeClr val="tx1"/>
+            </a:fontRef>
+          </p:style>
+          <p:txBody>
+            <a:bodyPr rtlCol="0" anchor="ctr"/>
+            <a:lstStyle/>
+            <a:p>
+              <a:pPr algn="ctr"/>
+              <a:endParaRPr lang="en-US"/>
+            </a:p>
+          </p:txBody>
+        </p:sp>
+        <p:cxnSp>
+          <p:nvCxnSpPr>
+            <p:cNvPr id="5" name="Straight Connector 4">
+              <a:extLst>
+                <a:ext uri="{FF2B5EF4-FFF2-40B4-BE49-F238E27FC236}">
+                  <a16:creationId xmlns:a16="http://schemas.microsoft.com/office/drawing/2014/main" id="{79D5EFDC-BA9A-164D-9ED8-663D3C519152}"/>
+                </a:ext>
+              </a:extLst>
+            </p:cNvPr>
+            <p:cNvCxnSpPr/>
+            <p:nvPr/>
+          </p:nvCxnSpPr>
+          <p:spPr>
+            <a:xfrm flipH="1">
+              <a:off x="5293558" y="3796278"/>
+              <a:ext cx="1588" cy="137159"/>
+            </a:xfrm>
+            <a:prstGeom prst="line">
+              <a:avLst/>
+            </a:prstGeom>
+            <a:ln w="28575">
+              <a:solidFill>
+                <a:srgbClr val="C00000"/>
+              </a:solidFill>
+            </a:ln>
+          </p:spPr>
+          <p:style>
+            <a:lnRef idx="1">
+              <a:schemeClr val="dk1"/>
+            </a:lnRef>
+            <a:fillRef idx="0">
+              <a:schemeClr val="dk1"/>
+            </a:fillRef>
+            <a:effectRef idx="0">
+              <a:schemeClr val="dk1"/>
+            </a:effectRef>
+            <a:fontRef idx="minor">
+              <a:schemeClr val="tx1"/>
+            </a:fontRef>
+          </p:style>
+        </p:cxnSp>
+        <p:cxnSp>
+          <p:nvCxnSpPr>
+            <p:cNvPr id="6" name="Straight Connector 5">
+              <a:extLst>
+                <a:ext uri="{FF2B5EF4-FFF2-40B4-BE49-F238E27FC236}">
+                  <a16:creationId xmlns:a16="http://schemas.microsoft.com/office/drawing/2014/main" id="{3F7BE500-7356-0E4E-B1B8-3C01E2864E48}"/>
+                </a:ext>
+              </a:extLst>
+            </p:cNvPr>
+            <p:cNvCxnSpPr/>
+            <p:nvPr/>
+          </p:nvCxnSpPr>
+          <p:spPr>
+            <a:xfrm flipV="1">
+              <a:off x="5293558" y="3912780"/>
+              <a:ext cx="659826" cy="2238"/>
+            </a:xfrm>
+            <a:prstGeom prst="line">
+              <a:avLst/>
+            </a:prstGeom>
+            <a:ln w="28575">
+              <a:solidFill>
+                <a:srgbClr val="C00000"/>
+              </a:solidFill>
+            </a:ln>
+          </p:spPr>
+          <p:style>
+            <a:lnRef idx="1">
+              <a:schemeClr val="dk1"/>
+            </a:lnRef>
+            <a:fillRef idx="0">
+              <a:schemeClr val="dk1"/>
+            </a:fillRef>
+            <a:effectRef idx="0">
+              <a:schemeClr val="dk1"/>
+            </a:effectRef>
+            <a:fontRef idx="minor">
+              <a:schemeClr val="tx1"/>
+            </a:fontRef>
+          </p:style>
+        </p:cxnSp>
+        <p:cxnSp>
+          <p:nvCxnSpPr>
+            <p:cNvPr id="7" name="Straight Connector 6">
+              <a:extLst>
+                <a:ext uri="{FF2B5EF4-FFF2-40B4-BE49-F238E27FC236}">
+                  <a16:creationId xmlns:a16="http://schemas.microsoft.com/office/drawing/2014/main" id="{C33904FE-637B-BE45-8600-C9C22BE8B7D3}"/>
+                </a:ext>
+              </a:extLst>
+            </p:cNvPr>
+            <p:cNvCxnSpPr/>
+            <p:nvPr/>
+          </p:nvCxnSpPr>
+          <p:spPr>
+            <a:xfrm flipH="1">
+              <a:off x="5948620" y="3794477"/>
+              <a:ext cx="1588" cy="137160"/>
+            </a:xfrm>
+            <a:prstGeom prst="line">
+              <a:avLst/>
+            </a:prstGeom>
+            <a:ln w="28575">
+              <a:solidFill>
+                <a:srgbClr val="C00000"/>
+              </a:solidFill>
+            </a:ln>
+          </p:spPr>
+          <p:style>
+            <a:lnRef idx="1">
+              <a:schemeClr val="dk1"/>
+            </a:lnRef>
+            <a:fillRef idx="0">
+              <a:schemeClr val="dk1"/>
+            </a:fillRef>
+            <a:effectRef idx="0">
+              <a:schemeClr val="dk1"/>
+            </a:effectRef>
+            <a:fontRef idx="minor">
+              <a:schemeClr val="tx1"/>
+            </a:fontRef>
+          </p:style>
+        </p:cxnSp>
+      </p:grpSp>
+      <p:cxnSp>
+        <p:nvCxnSpPr>
+          <p:cNvPr id="43" name="Straight Arrow Connector 42">
+            <a:extLst>
+              <a:ext uri="{FF2B5EF4-FFF2-40B4-BE49-F238E27FC236}">
+                <a16:creationId xmlns:a16="http://schemas.microsoft.com/office/drawing/2014/main" id="{7EA374A8-B0D0-CC4E-B750-F361ABC5F27B}"/>
+              </a:ext>
+            </a:extLst>
+          </p:cNvPr>
+          <p:cNvCxnSpPr/>
+          <p:nvPr/>
+        </p:nvCxnSpPr>
+        <p:spPr>
+          <a:xfrm flipV="1">
+            <a:off x="5769610" y="3341424"/>
+            <a:ext cx="2637" cy="439764"/>
+          </a:xfrm>
+          <a:prstGeom prst="straightConnector1">
+            <a:avLst/>
+          </a:prstGeom>
+          <a:ln w="25400">
+            <a:tailEnd type="triangle" w="lg" len="lg"/>
+          </a:ln>
+        </p:spPr>
+        <p:style>
+          <a:lnRef idx="1">
+            <a:schemeClr val="accent3"/>
+          </a:lnRef>
+          <a:fillRef idx="0">
+            <a:schemeClr val="accent3"/>
+          </a:fillRef>
+          <a:effectRef idx="0">
+            <a:schemeClr val="accent3"/>
+          </a:effectRef>
+          <a:fontRef idx="minor">
+            <a:schemeClr val="tx1"/>
+          </a:fontRef>
+        </p:style>
+      </p:cxnSp>
+      <p:cxnSp>
+        <p:nvCxnSpPr>
+          <p:cNvPr id="44" name="Straight Connector 43">
+            <a:extLst>
+              <a:ext uri="{FF2B5EF4-FFF2-40B4-BE49-F238E27FC236}">
+                <a16:creationId xmlns:a16="http://schemas.microsoft.com/office/drawing/2014/main" id="{821488D2-9017-3F4E-8EE7-F9FA29E1454E}"/>
+              </a:ext>
+            </a:extLst>
+          </p:cNvPr>
+          <p:cNvCxnSpPr>
+            <a:cxnSpLocks/>
+            <a:stCxn id="47" idx="4"/>
+            <a:endCxn id="50" idx="4"/>
+          </p:cNvCxnSpPr>
+          <p:nvPr/>
+        </p:nvCxnSpPr>
+        <p:spPr>
+          <a:xfrm flipH="1" flipV="1">
+            <a:off x="5777440" y="2627696"/>
+            <a:ext cx="0" cy="601311"/>
+          </a:xfrm>
+          <a:prstGeom prst="line">
+            <a:avLst/>
+          </a:prstGeom>
+          <a:ln w="25400"/>
+        </p:spPr>
+        <p:style>
+          <a:lnRef idx="1">
+            <a:schemeClr val="accent3"/>
+          </a:lnRef>
+          <a:fillRef idx="0">
+            <a:schemeClr val="accent3"/>
+          </a:fillRef>
+          <a:effectRef idx="0">
+            <a:schemeClr val="accent3"/>
+          </a:effectRef>
+          <a:fontRef idx="minor">
+            <a:schemeClr val="tx1"/>
+          </a:fontRef>
+        </p:style>
+      </p:cxnSp>
       <p:sp>
         <p:nvSpPr>
-          <p:cNvPr id="48" name="Rounded Rectangle 47">
-            <a:extLst>
-              <a:ext uri="{FF2B5EF4-FFF2-40B4-BE49-F238E27FC236}">
-                <a16:creationId xmlns:a16="http://schemas.microsoft.com/office/drawing/2014/main" id="{9524DE2A-7CE0-4843-AC76-97529532D02A}"/>
+          <p:cNvPr id="47" name="Freeform 46">
+            <a:extLst>
+              <a:ext uri="{FF2B5EF4-FFF2-40B4-BE49-F238E27FC236}">
+                <a16:creationId xmlns:a16="http://schemas.microsoft.com/office/drawing/2014/main" id="{7C89FA2D-FA1E-B74E-9759-49FA16AFD8F3}"/>
               </a:ext>
             </a:extLst>
           </p:cNvPr>
@@ -21404,61 +21366,7 @@
         </p:nvSpPr>
         <p:spPr>
           <a:xfrm>
-            <a:off x="6007264" y="2461828"/>
-            <a:ext cx="612967" cy="255371"/>
-          </a:xfrm>
-          <a:prstGeom prst="roundRect">
-            <a:avLst>
-              <a:gd name="adj" fmla="val 50000"/>
-            </a:avLst>
-          </a:prstGeom>
-          <a:solidFill>
-            <a:schemeClr val="accent1">
-              <a:lumMod val="40000"/>
-              <a:lumOff val="60000"/>
-            </a:schemeClr>
-          </a:solidFill>
-        </p:spPr>
-        <p:style>
-          <a:lnRef idx="2">
-            <a:schemeClr val="accent1">
-              <a:shade val="50000"/>
-            </a:schemeClr>
-          </a:lnRef>
-          <a:fillRef idx="1">
-            <a:schemeClr val="accent1"/>
-          </a:fillRef>
-          <a:effectRef idx="0">
-            <a:schemeClr val="accent1"/>
-          </a:effectRef>
-          <a:fontRef idx="minor">
-            <a:schemeClr val="lt1"/>
-          </a:fontRef>
-        </p:style>
-        <p:txBody>
-          <a:bodyPr rtlCol="0" anchor="ctr"/>
-          <a:lstStyle/>
-          <a:p>
-            <a:pPr algn="ctr"/>
-            <a:endParaRPr lang="en-US"/>
-          </a:p>
-        </p:txBody>
-      </p:sp>
-      <p:sp>
-        <p:nvSpPr>
-          <p:cNvPr id="49" name="Freeform 48">
-            <a:extLst>
-              <a:ext uri="{FF2B5EF4-FFF2-40B4-BE49-F238E27FC236}">
-                <a16:creationId xmlns:a16="http://schemas.microsoft.com/office/drawing/2014/main" id="{546205D1-2995-AF42-A4A1-E30F86766151}"/>
-              </a:ext>
-            </a:extLst>
-          </p:cNvPr>
-          <p:cNvSpPr/>
-          <p:nvPr/>
-        </p:nvSpPr>
-        <p:spPr>
-          <a:xfrm>
-            <a:off x="6160929" y="2547956"/>
+            <a:off x="5495735" y="3228059"/>
             <a:ext cx="571347" cy="83114"/>
           </a:xfrm>
           <a:custGeom>
@@ -21652,10 +21560,849 @@
       </p:sp>
       <p:cxnSp>
         <p:nvCxnSpPr>
-          <p:cNvPr id="51" name="Straight Arrow Connector 246">
-            <a:extLst>
-              <a:ext uri="{FF2B5EF4-FFF2-40B4-BE49-F238E27FC236}">
-                <a16:creationId xmlns:a16="http://schemas.microsoft.com/office/drawing/2014/main" id="{E5C4213B-8B34-334D-BFD5-CF21DA0720D2}"/>
+          <p:cNvPr id="54" name="Elbow Connector 53">
+            <a:extLst>
+              <a:ext uri="{FF2B5EF4-FFF2-40B4-BE49-F238E27FC236}">
+                <a16:creationId xmlns:a16="http://schemas.microsoft.com/office/drawing/2014/main" id="{6D04C903-C975-0648-AAB9-4ED36891E23B}"/>
+              </a:ext>
+            </a:extLst>
+          </p:cNvPr>
+          <p:cNvCxnSpPr>
+            <a:cxnSpLocks/>
+          </p:cNvCxnSpPr>
+          <p:nvPr/>
+        </p:nvCxnSpPr>
+        <p:spPr>
+          <a:xfrm>
+            <a:off x="7990089" y="2282971"/>
+            <a:ext cx="422391" cy="1274100"/>
+          </a:xfrm>
+          <a:prstGeom prst="bentConnector2">
+            <a:avLst/>
+          </a:prstGeom>
+          <a:ln w="25400">
+            <a:solidFill>
+              <a:srgbClr val="7030A0"/>
+            </a:solidFill>
+            <a:tailEnd type="diamond" w="lg" len="lg"/>
+          </a:ln>
+        </p:spPr>
+        <p:style>
+          <a:lnRef idx="1">
+            <a:schemeClr val="accent3"/>
+          </a:lnRef>
+          <a:fillRef idx="0">
+            <a:schemeClr val="accent3"/>
+          </a:fillRef>
+          <a:effectRef idx="0">
+            <a:schemeClr val="accent3"/>
+          </a:effectRef>
+          <a:fontRef idx="minor">
+            <a:schemeClr val="tx1"/>
+          </a:fontRef>
+        </p:style>
+      </p:cxnSp>
+      <p:cxnSp>
+        <p:nvCxnSpPr>
+          <p:cNvPr id="55" name="Straight Connector 54">
+            <a:extLst>
+              <a:ext uri="{FF2B5EF4-FFF2-40B4-BE49-F238E27FC236}">
+                <a16:creationId xmlns:a16="http://schemas.microsoft.com/office/drawing/2014/main" id="{6B67F427-58B5-EF48-A516-8BD8C0D3DA5E}"/>
+              </a:ext>
+            </a:extLst>
+          </p:cNvPr>
+          <p:cNvCxnSpPr/>
+          <p:nvPr/>
+        </p:nvCxnSpPr>
+        <p:spPr>
+          <a:xfrm>
+            <a:off x="7812734" y="2559053"/>
+            <a:ext cx="0" cy="1837944"/>
+          </a:xfrm>
+          <a:prstGeom prst="line">
+            <a:avLst/>
+          </a:prstGeom>
+          <a:ln w="25400">
+            <a:solidFill>
+              <a:srgbClr val="C00000"/>
+            </a:solidFill>
+          </a:ln>
+        </p:spPr>
+        <p:style>
+          <a:lnRef idx="1">
+            <a:schemeClr val="accent3"/>
+          </a:lnRef>
+          <a:fillRef idx="0">
+            <a:schemeClr val="accent3"/>
+          </a:fillRef>
+          <a:effectRef idx="0">
+            <a:schemeClr val="accent3"/>
+          </a:effectRef>
+          <a:fontRef idx="minor">
+            <a:schemeClr val="tx1"/>
+          </a:fontRef>
+        </p:style>
+      </p:cxnSp>
+      <p:sp>
+        <p:nvSpPr>
+          <p:cNvPr id="56" name="Freeform 55">
+            <a:extLst>
+              <a:ext uri="{FF2B5EF4-FFF2-40B4-BE49-F238E27FC236}">
+                <a16:creationId xmlns:a16="http://schemas.microsoft.com/office/drawing/2014/main" id="{1442DEA8-EBE8-6F49-B704-A20C00605CE2}"/>
+              </a:ext>
+            </a:extLst>
+          </p:cNvPr>
+          <p:cNvSpPr/>
+          <p:nvPr/>
+        </p:nvSpPr>
+        <p:spPr>
+          <a:xfrm>
+            <a:off x="7966400" y="3655788"/>
+            <a:ext cx="868442" cy="180707"/>
+          </a:xfrm>
+          <a:custGeom>
+            <a:avLst/>
+            <a:gdLst>
+              <a:gd name="connsiteX0" fmla="*/ 0 w 4142629"/>
+              <a:gd name="connsiteY0" fmla="*/ 854057 h 862008"/>
+              <a:gd name="connsiteX1" fmla="*/ 1470991 w 4142629"/>
+              <a:gd name="connsiteY1" fmla="*/ 691055 h 862008"/>
+              <a:gd name="connsiteX2" fmla="*/ 174928 w 4142629"/>
+              <a:gd name="connsiteY2" fmla="*/ 301441 h 862008"/>
+              <a:gd name="connsiteX3" fmla="*/ 1411356 w 4142629"/>
+              <a:gd name="connsiteY3" fmla="*/ 35072 h 862008"/>
+              <a:gd name="connsiteX4" fmla="*/ 2747175 w 4142629"/>
+              <a:gd name="connsiteY4" fmla="*/ 31097 h 862008"/>
+              <a:gd name="connsiteX5" fmla="*/ 3951798 w 4142629"/>
+              <a:gd name="connsiteY5" fmla="*/ 293490 h 862008"/>
+              <a:gd name="connsiteX6" fmla="*/ 2671638 w 4142629"/>
+              <a:gd name="connsiteY6" fmla="*/ 675152 h 862008"/>
+              <a:gd name="connsiteX7" fmla="*/ 4142629 w 4142629"/>
+              <a:gd name="connsiteY7" fmla="*/ 862008 h 862008"/>
+            </a:gdLst>
+            <a:ahLst/>
+            <a:cxnLst>
+              <a:cxn ang="0">
+                <a:pos x="connsiteX0" y="connsiteY0"/>
+              </a:cxn>
+              <a:cxn ang="0">
+                <a:pos x="connsiteX1" y="connsiteY1"/>
+              </a:cxn>
+              <a:cxn ang="0">
+                <a:pos x="connsiteX2" y="connsiteY2"/>
+              </a:cxn>
+              <a:cxn ang="0">
+                <a:pos x="connsiteX3" y="connsiteY3"/>
+              </a:cxn>
+              <a:cxn ang="0">
+                <a:pos x="connsiteX4" y="connsiteY4"/>
+              </a:cxn>
+              <a:cxn ang="0">
+                <a:pos x="connsiteX5" y="connsiteY5"/>
+              </a:cxn>
+              <a:cxn ang="0">
+                <a:pos x="connsiteX6" y="connsiteY6"/>
+              </a:cxn>
+              <a:cxn ang="0">
+                <a:pos x="connsiteX7" y="connsiteY7"/>
+              </a:cxn>
+            </a:cxnLst>
+            <a:rect l="l" t="t" r="r" b="b"/>
+            <a:pathLst>
+              <a:path w="4142629" h="862008">
+                <a:moveTo>
+                  <a:pt x="0" y="854057"/>
+                </a:moveTo>
+                <a:cubicBezTo>
+                  <a:pt x="720918" y="818607"/>
+                  <a:pt x="1441836" y="783158"/>
+                  <a:pt x="1470991" y="691055"/>
+                </a:cubicBezTo>
+                <a:cubicBezTo>
+                  <a:pt x="1500146" y="598952"/>
+                  <a:pt x="184867" y="410771"/>
+                  <a:pt x="174928" y="301441"/>
+                </a:cubicBezTo>
+                <a:cubicBezTo>
+                  <a:pt x="164989" y="192111"/>
+                  <a:pt x="982648" y="80129"/>
+                  <a:pt x="1411356" y="35072"/>
+                </a:cubicBezTo>
+                <a:cubicBezTo>
+                  <a:pt x="1840064" y="-9985"/>
+                  <a:pt x="2323768" y="-11973"/>
+                  <a:pt x="2747175" y="31097"/>
+                </a:cubicBezTo>
+                <a:cubicBezTo>
+                  <a:pt x="3170582" y="74167"/>
+                  <a:pt x="3964387" y="186148"/>
+                  <a:pt x="3951798" y="293490"/>
+                </a:cubicBezTo>
+                <a:cubicBezTo>
+                  <a:pt x="3939209" y="400832"/>
+                  <a:pt x="2639833" y="580399"/>
+                  <a:pt x="2671638" y="675152"/>
+                </a:cubicBezTo>
+                <a:cubicBezTo>
+                  <a:pt x="2703443" y="769905"/>
+                  <a:pt x="3423036" y="815956"/>
+                  <a:pt x="4142629" y="862008"/>
+                </a:cubicBezTo>
+              </a:path>
+            </a:pathLst>
+          </a:custGeom>
+          <a:ln w="28575"/>
+        </p:spPr>
+        <p:style>
+          <a:lnRef idx="1">
+            <a:schemeClr val="dk1"/>
+          </a:lnRef>
+          <a:fillRef idx="0">
+            <a:schemeClr val="dk1"/>
+          </a:fillRef>
+          <a:effectRef idx="0">
+            <a:schemeClr val="dk1"/>
+          </a:effectRef>
+          <a:fontRef idx="minor">
+            <a:schemeClr val="tx1"/>
+          </a:fontRef>
+        </p:style>
+        <p:txBody>
+          <a:bodyPr rtlCol="0" anchor="ctr"/>
+          <a:lstStyle/>
+          <a:p>
+            <a:pPr algn="ctr"/>
+            <a:endParaRPr lang="en-US"/>
+          </a:p>
+        </p:txBody>
+      </p:sp>
+      <p:sp>
+        <p:nvSpPr>
+          <p:cNvPr id="57" name="TextBox 56">
+            <a:extLst>
+              <a:ext uri="{FF2B5EF4-FFF2-40B4-BE49-F238E27FC236}">
+                <a16:creationId xmlns:a16="http://schemas.microsoft.com/office/drawing/2014/main" id="{145499E7-A5DC-1A4C-9E97-79FE003DC539}"/>
+              </a:ext>
+            </a:extLst>
+          </p:cNvPr>
+          <p:cNvSpPr txBox="1"/>
+          <p:nvPr/>
+        </p:nvSpPr>
+        <p:spPr>
+          <a:xfrm>
+            <a:off x="7919359" y="3804739"/>
+            <a:ext cx="985847" cy="646331"/>
+          </a:xfrm>
+          <a:prstGeom prst="rect">
+            <a:avLst/>
+          </a:prstGeom>
+          <a:noFill/>
+        </p:spPr>
+        <p:txBody>
+          <a:bodyPr wrap="none" rtlCol="0">
+            <a:spAutoFit/>
+          </a:bodyPr>
+          <a:lstStyle/>
+          <a:p>
+            <a:pPr algn="ctr"/>
+            <a:r>
+              <a:rPr lang="en-US" dirty="0"/>
+              <a:t>genomic</a:t>
+            </a:r>
+          </a:p>
+          <a:p>
+            <a:pPr algn="ctr"/>
+            <a:r>
+              <a:rPr lang="en-US" dirty="0"/>
+              <a:t>target</a:t>
+            </a:r>
+          </a:p>
+        </p:txBody>
+      </p:sp>
+      <p:cxnSp>
+        <p:nvCxnSpPr>
+          <p:cNvPr id="58" name="Straight Arrow Connector 57">
+            <a:extLst>
+              <a:ext uri="{FF2B5EF4-FFF2-40B4-BE49-F238E27FC236}">
+                <a16:creationId xmlns:a16="http://schemas.microsoft.com/office/drawing/2014/main" id="{86974366-DB81-1545-B144-7D769EE7AF95}"/>
+              </a:ext>
+            </a:extLst>
+          </p:cNvPr>
+          <p:cNvCxnSpPr>
+            <a:cxnSpLocks/>
+          </p:cNvCxnSpPr>
+          <p:nvPr/>
+        </p:nvCxnSpPr>
+        <p:spPr>
+          <a:xfrm flipV="1">
+            <a:off x="2667520" y="3434976"/>
+            <a:ext cx="0" cy="365760"/>
+          </a:xfrm>
+          <a:prstGeom prst="straightConnector1">
+            <a:avLst/>
+          </a:prstGeom>
+          <a:ln w="25400">
+            <a:tailEnd type="triangle" w="lg" len="lg"/>
+          </a:ln>
+        </p:spPr>
+        <p:style>
+          <a:lnRef idx="1">
+            <a:schemeClr val="accent3"/>
+          </a:lnRef>
+          <a:fillRef idx="0">
+            <a:schemeClr val="accent3"/>
+          </a:fillRef>
+          <a:effectRef idx="0">
+            <a:schemeClr val="accent3"/>
+          </a:effectRef>
+          <a:fontRef idx="minor">
+            <a:schemeClr val="tx1"/>
+          </a:fontRef>
+        </p:style>
+      </p:cxnSp>
+      <p:sp>
+        <p:nvSpPr>
+          <p:cNvPr id="59" name="Pentagon 58">
+            <a:extLst>
+              <a:ext uri="{FF2B5EF4-FFF2-40B4-BE49-F238E27FC236}">
+                <a16:creationId xmlns:a16="http://schemas.microsoft.com/office/drawing/2014/main" id="{A99B08E0-665C-D846-849C-F5AE58F70CC8}"/>
+              </a:ext>
+            </a:extLst>
+          </p:cNvPr>
+          <p:cNvSpPr/>
+          <p:nvPr/>
+        </p:nvSpPr>
+        <p:spPr>
+          <a:xfrm>
+            <a:off x="2320863" y="3774296"/>
+            <a:ext cx="773535" cy="326065"/>
+          </a:xfrm>
+          <a:prstGeom prst="homePlate">
+            <a:avLst/>
+          </a:prstGeom>
+          <a:solidFill>
+            <a:schemeClr val="accent6">
+              <a:lumMod val="60000"/>
+              <a:lumOff val="40000"/>
+            </a:schemeClr>
+          </a:solidFill>
+        </p:spPr>
+        <p:style>
+          <a:lnRef idx="2">
+            <a:schemeClr val="accent6">
+              <a:shade val="50000"/>
+            </a:schemeClr>
+          </a:lnRef>
+          <a:fillRef idx="1">
+            <a:schemeClr val="accent6"/>
+          </a:fillRef>
+          <a:effectRef idx="0">
+            <a:schemeClr val="accent6"/>
+          </a:effectRef>
+          <a:fontRef idx="minor">
+            <a:schemeClr val="lt1"/>
+          </a:fontRef>
+        </p:style>
+        <p:txBody>
+          <a:bodyPr rtlCol="0" anchor="ctr"/>
+          <a:lstStyle/>
+          <a:p>
+            <a:pPr algn="ctr"/>
+            <a:r>
+              <a:rPr lang="en-US" dirty="0">
+                <a:solidFill>
+                  <a:schemeClr val="tx1"/>
+                </a:solidFill>
+              </a:rPr>
+              <a:t>TF-A</a:t>
+            </a:r>
+          </a:p>
+        </p:txBody>
+      </p:sp>
+      <p:sp>
+        <p:nvSpPr>
+          <p:cNvPr id="60" name="Rounded Rectangle 59">
+            <a:extLst>
+              <a:ext uri="{FF2B5EF4-FFF2-40B4-BE49-F238E27FC236}">
+                <a16:creationId xmlns:a16="http://schemas.microsoft.com/office/drawing/2014/main" id="{AF2FC26E-771F-D14A-934F-A62A2DB82E8F}"/>
+              </a:ext>
+            </a:extLst>
+          </p:cNvPr>
+          <p:cNvSpPr/>
+          <p:nvPr/>
+        </p:nvSpPr>
+        <p:spPr>
+          <a:xfrm>
+            <a:off x="2361037" y="3171047"/>
+            <a:ext cx="612967" cy="255371"/>
+          </a:xfrm>
+          <a:prstGeom prst="roundRect">
+            <a:avLst>
+              <a:gd name="adj" fmla="val 50000"/>
+            </a:avLst>
+          </a:prstGeom>
+          <a:solidFill>
+            <a:schemeClr val="accent6">
+              <a:lumMod val="60000"/>
+              <a:lumOff val="40000"/>
+            </a:schemeClr>
+          </a:solidFill>
+        </p:spPr>
+        <p:style>
+          <a:lnRef idx="2">
+            <a:schemeClr val="accent6">
+              <a:shade val="50000"/>
+            </a:schemeClr>
+          </a:lnRef>
+          <a:fillRef idx="1">
+            <a:schemeClr val="accent6"/>
+          </a:fillRef>
+          <a:effectRef idx="0">
+            <a:schemeClr val="accent6"/>
+          </a:effectRef>
+          <a:fontRef idx="minor">
+            <a:schemeClr val="lt1"/>
+          </a:fontRef>
+        </p:style>
+        <p:txBody>
+          <a:bodyPr wrap="none" rtlCol="0" anchor="ctr"/>
+          <a:lstStyle/>
+          <a:p>
+            <a:pPr algn="ctr"/>
+            <a:endParaRPr lang="en-US" dirty="0">
+              <a:solidFill>
+                <a:schemeClr val="tx1"/>
+              </a:solidFill>
+            </a:endParaRPr>
+          </a:p>
+        </p:txBody>
+      </p:sp>
+      <p:cxnSp>
+        <p:nvCxnSpPr>
+          <p:cNvPr id="61" name="Elbow Connector 60">
+            <a:extLst>
+              <a:ext uri="{FF2B5EF4-FFF2-40B4-BE49-F238E27FC236}">
+                <a16:creationId xmlns:a16="http://schemas.microsoft.com/office/drawing/2014/main" id="{32E15424-F008-3D48-84FA-A22AF5A613B4}"/>
+              </a:ext>
+            </a:extLst>
+          </p:cNvPr>
+          <p:cNvCxnSpPr>
+            <a:cxnSpLocks/>
+          </p:cNvCxnSpPr>
+          <p:nvPr/>
+        </p:nvCxnSpPr>
+        <p:spPr>
+          <a:xfrm flipV="1">
+            <a:off x="2160273" y="3631204"/>
+            <a:ext cx="328764" cy="301158"/>
+          </a:xfrm>
+          <a:prstGeom prst="bentConnector3">
+            <a:avLst>
+              <a:gd name="adj1" fmla="val 2567"/>
+            </a:avLst>
+          </a:prstGeom>
+          <a:ln w="38100">
+            <a:headEnd type="none" w="med" len="med"/>
+            <a:tailEnd type="arrow" w="med" len="med"/>
+          </a:ln>
+        </p:spPr>
+        <p:style>
+          <a:lnRef idx="3">
+            <a:schemeClr val="dk1"/>
+          </a:lnRef>
+          <a:fillRef idx="0">
+            <a:schemeClr val="dk1"/>
+          </a:fillRef>
+          <a:effectRef idx="2">
+            <a:schemeClr val="dk1"/>
+          </a:effectRef>
+          <a:fontRef idx="minor">
+            <a:schemeClr val="tx1"/>
+          </a:fontRef>
+        </p:style>
+      </p:cxnSp>
+      <p:cxnSp>
+        <p:nvCxnSpPr>
+          <p:cNvPr id="62" name="Straight Arrow Connector 246">
+            <a:extLst>
+              <a:ext uri="{FF2B5EF4-FFF2-40B4-BE49-F238E27FC236}">
+                <a16:creationId xmlns:a16="http://schemas.microsoft.com/office/drawing/2014/main" id="{0BD087FC-5771-BF43-A34B-54D5AC5319C4}"/>
+              </a:ext>
+            </a:extLst>
+          </p:cNvPr>
+          <p:cNvCxnSpPr>
+            <a:cxnSpLocks/>
+            <a:stCxn id="60" idx="0"/>
+          </p:cNvCxnSpPr>
+          <p:nvPr/>
+        </p:nvCxnSpPr>
+        <p:spPr>
+          <a:xfrm rot="16200000" flipH="1">
+            <a:off x="2755377" y="3083191"/>
+            <a:ext cx="394678" cy="570390"/>
+          </a:xfrm>
+          <a:prstGeom prst="bentConnector4">
+            <a:avLst>
+              <a:gd name="adj1" fmla="val -57921"/>
+              <a:gd name="adj2" fmla="val 99877"/>
+            </a:avLst>
+          </a:prstGeom>
+          <a:ln w="25400">
+            <a:solidFill>
+              <a:schemeClr val="accent6"/>
+            </a:solidFill>
+            <a:tailEnd type="triangle" w="lg" len="lg"/>
+          </a:ln>
+        </p:spPr>
+        <p:style>
+          <a:lnRef idx="1">
+            <a:schemeClr val="accent3"/>
+          </a:lnRef>
+          <a:fillRef idx="0">
+            <a:schemeClr val="accent3"/>
+          </a:fillRef>
+          <a:effectRef idx="0">
+            <a:schemeClr val="accent3"/>
+          </a:effectRef>
+          <a:fontRef idx="minor">
+            <a:schemeClr val="tx1"/>
+          </a:fontRef>
+        </p:style>
+      </p:cxnSp>
+      <p:grpSp>
+        <p:nvGrpSpPr>
+          <p:cNvPr id="64" name="Group 63">
+            <a:extLst>
+              <a:ext uri="{FF2B5EF4-FFF2-40B4-BE49-F238E27FC236}">
+                <a16:creationId xmlns:a16="http://schemas.microsoft.com/office/drawing/2014/main" id="{AE895FC5-0E02-F94D-AF9C-CE71A841B345}"/>
+              </a:ext>
+            </a:extLst>
+          </p:cNvPr>
+          <p:cNvGrpSpPr/>
+          <p:nvPr/>
+        </p:nvGrpSpPr>
+        <p:grpSpPr>
+          <a:xfrm>
+            <a:off x="4584046" y="3780688"/>
+            <a:ext cx="484281" cy="172854"/>
+            <a:chOff x="5293558" y="3697843"/>
+            <a:chExt cx="660058" cy="235594"/>
+          </a:xfrm>
+        </p:grpSpPr>
+        <p:sp>
+          <p:nvSpPr>
+            <p:cNvPr id="65" name="Freeform 64">
+              <a:extLst>
+                <a:ext uri="{FF2B5EF4-FFF2-40B4-BE49-F238E27FC236}">
+                  <a16:creationId xmlns:a16="http://schemas.microsoft.com/office/drawing/2014/main" id="{52571C49-9F59-884F-96ED-A03CE95CE82D}"/>
+                </a:ext>
+              </a:extLst>
+            </p:cNvPr>
+            <p:cNvSpPr/>
+            <p:nvPr/>
+          </p:nvSpPr>
+          <p:spPr>
+            <a:xfrm>
+              <a:off x="5293558" y="3697843"/>
+              <a:ext cx="660058" cy="108654"/>
+            </a:xfrm>
+            <a:custGeom>
+              <a:avLst/>
+              <a:gdLst>
+                <a:gd name="connsiteX0" fmla="*/ 0 w 7331149"/>
+                <a:gd name="connsiteY0" fmla="*/ 1206795 h 1206795"/>
+                <a:gd name="connsiteX1" fmla="*/ 1217428 w 7331149"/>
+                <a:gd name="connsiteY1" fmla="*/ 0 h 1206795"/>
+                <a:gd name="connsiteX2" fmla="*/ 2434856 w 7331149"/>
+                <a:gd name="connsiteY2" fmla="*/ 1201479 h 1206795"/>
+                <a:gd name="connsiteX3" fmla="*/ 3657600 w 7331149"/>
+                <a:gd name="connsiteY3" fmla="*/ 0 h 1206795"/>
+                <a:gd name="connsiteX4" fmla="*/ 4890977 w 7331149"/>
+                <a:gd name="connsiteY4" fmla="*/ 1206795 h 1206795"/>
+                <a:gd name="connsiteX5" fmla="*/ 6087140 w 7331149"/>
+                <a:gd name="connsiteY5" fmla="*/ 0 h 1206795"/>
+                <a:gd name="connsiteX6" fmla="*/ 7331149 w 7331149"/>
+                <a:gd name="connsiteY6" fmla="*/ 1201479 h 1206795"/>
+              </a:gdLst>
+              <a:ahLst/>
+              <a:cxnLst>
+                <a:cxn ang="0">
+                  <a:pos x="connsiteX0" y="connsiteY0"/>
+                </a:cxn>
+                <a:cxn ang="0">
+                  <a:pos x="connsiteX1" y="connsiteY1"/>
+                </a:cxn>
+                <a:cxn ang="0">
+                  <a:pos x="connsiteX2" y="connsiteY2"/>
+                </a:cxn>
+                <a:cxn ang="0">
+                  <a:pos x="connsiteX3" y="connsiteY3"/>
+                </a:cxn>
+                <a:cxn ang="0">
+                  <a:pos x="connsiteX4" y="connsiteY4"/>
+                </a:cxn>
+                <a:cxn ang="0">
+                  <a:pos x="connsiteX5" y="connsiteY5"/>
+                </a:cxn>
+                <a:cxn ang="0">
+                  <a:pos x="connsiteX6" y="connsiteY6"/>
+                </a:cxn>
+              </a:cxnLst>
+              <a:rect l="l" t="t" r="r" b="b"/>
+              <a:pathLst>
+                <a:path w="7331149" h="1206795">
+                  <a:moveTo>
+                    <a:pt x="0" y="1206795"/>
+                  </a:moveTo>
+                  <a:cubicBezTo>
+                    <a:pt x="405809" y="603840"/>
+                    <a:pt x="811619" y="886"/>
+                    <a:pt x="1217428" y="0"/>
+                  </a:cubicBezTo>
+                  <a:cubicBezTo>
+                    <a:pt x="1623237" y="-886"/>
+                    <a:pt x="2028161" y="1201479"/>
+                    <a:pt x="2434856" y="1201479"/>
+                  </a:cubicBezTo>
+                  <a:cubicBezTo>
+                    <a:pt x="2841551" y="1201479"/>
+                    <a:pt x="3248247" y="-886"/>
+                    <a:pt x="3657600" y="0"/>
+                  </a:cubicBezTo>
+                  <a:cubicBezTo>
+                    <a:pt x="4066954" y="886"/>
+                    <a:pt x="4486054" y="1206795"/>
+                    <a:pt x="4890977" y="1206795"/>
+                  </a:cubicBezTo>
+                  <a:cubicBezTo>
+                    <a:pt x="5295900" y="1206795"/>
+                    <a:pt x="5680445" y="886"/>
+                    <a:pt x="6087140" y="0"/>
+                  </a:cubicBezTo>
+                  <a:cubicBezTo>
+                    <a:pt x="6493835" y="-886"/>
+                    <a:pt x="6912492" y="600296"/>
+                    <a:pt x="7331149" y="1201479"/>
+                  </a:cubicBezTo>
+                </a:path>
+              </a:pathLst>
+            </a:custGeom>
+            <a:ln w="28575">
+              <a:solidFill>
+                <a:srgbClr val="C00000"/>
+              </a:solidFill>
+            </a:ln>
+          </p:spPr>
+          <p:style>
+            <a:lnRef idx="1">
+              <a:schemeClr val="dk1"/>
+            </a:lnRef>
+            <a:fillRef idx="0">
+              <a:schemeClr val="dk1"/>
+            </a:fillRef>
+            <a:effectRef idx="0">
+              <a:schemeClr val="dk1"/>
+            </a:effectRef>
+            <a:fontRef idx="minor">
+              <a:schemeClr val="tx1"/>
+            </a:fontRef>
+          </p:style>
+          <p:txBody>
+            <a:bodyPr rtlCol="0" anchor="ctr"/>
+            <a:lstStyle/>
+            <a:p>
+              <a:pPr algn="ctr"/>
+              <a:endParaRPr lang="en-US"/>
+            </a:p>
+          </p:txBody>
+        </p:sp>
+        <p:cxnSp>
+          <p:nvCxnSpPr>
+            <p:cNvPr id="66" name="Straight Connector 65">
+              <a:extLst>
+                <a:ext uri="{FF2B5EF4-FFF2-40B4-BE49-F238E27FC236}">
+                  <a16:creationId xmlns:a16="http://schemas.microsoft.com/office/drawing/2014/main" id="{09F6CEE5-5C03-BF47-92A6-520883E5254B}"/>
+                </a:ext>
+              </a:extLst>
+            </p:cNvPr>
+            <p:cNvCxnSpPr/>
+            <p:nvPr/>
+          </p:nvCxnSpPr>
+          <p:spPr>
+            <a:xfrm flipH="1">
+              <a:off x="5293558" y="3796278"/>
+              <a:ext cx="1588" cy="137159"/>
+            </a:xfrm>
+            <a:prstGeom prst="line">
+              <a:avLst/>
+            </a:prstGeom>
+            <a:ln w="28575">
+              <a:solidFill>
+                <a:srgbClr val="C00000"/>
+              </a:solidFill>
+            </a:ln>
+          </p:spPr>
+          <p:style>
+            <a:lnRef idx="1">
+              <a:schemeClr val="dk1"/>
+            </a:lnRef>
+            <a:fillRef idx="0">
+              <a:schemeClr val="dk1"/>
+            </a:fillRef>
+            <a:effectRef idx="0">
+              <a:schemeClr val="dk1"/>
+            </a:effectRef>
+            <a:fontRef idx="minor">
+              <a:schemeClr val="tx1"/>
+            </a:fontRef>
+          </p:style>
+        </p:cxnSp>
+        <p:cxnSp>
+          <p:nvCxnSpPr>
+            <p:cNvPr id="67" name="Straight Connector 66">
+              <a:extLst>
+                <a:ext uri="{FF2B5EF4-FFF2-40B4-BE49-F238E27FC236}">
+                  <a16:creationId xmlns:a16="http://schemas.microsoft.com/office/drawing/2014/main" id="{14B393D9-0B65-094D-AA49-C4B640752CC0}"/>
+                </a:ext>
+              </a:extLst>
+            </p:cNvPr>
+            <p:cNvCxnSpPr>
+              <a:cxnSpLocks/>
+              <a:endCxn id="41" idx="3"/>
+            </p:cNvCxnSpPr>
+            <p:nvPr/>
+          </p:nvCxnSpPr>
+          <p:spPr>
+            <a:xfrm>
+              <a:off x="5293558" y="3915018"/>
+              <a:ext cx="198625" cy="3481"/>
+            </a:xfrm>
+            <a:prstGeom prst="line">
+              <a:avLst/>
+            </a:prstGeom>
+            <a:ln w="28575">
+              <a:solidFill>
+                <a:srgbClr val="C00000"/>
+              </a:solidFill>
+            </a:ln>
+          </p:spPr>
+          <p:style>
+            <a:lnRef idx="1">
+              <a:schemeClr val="dk1"/>
+            </a:lnRef>
+            <a:fillRef idx="0">
+              <a:schemeClr val="dk1"/>
+            </a:fillRef>
+            <a:effectRef idx="0">
+              <a:schemeClr val="dk1"/>
+            </a:effectRef>
+            <a:fontRef idx="minor">
+              <a:schemeClr val="tx1"/>
+            </a:fontRef>
+          </p:style>
+        </p:cxnSp>
+      </p:grpSp>
+      <p:sp>
+        <p:nvSpPr>
+          <p:cNvPr id="73" name="Rectangle 72">
+            <a:extLst>
+              <a:ext uri="{FF2B5EF4-FFF2-40B4-BE49-F238E27FC236}">
+                <a16:creationId xmlns:a16="http://schemas.microsoft.com/office/drawing/2014/main" id="{84F3C148-BB44-424F-BD60-FC61A288F955}"/>
+              </a:ext>
+            </a:extLst>
+          </p:cNvPr>
+          <p:cNvSpPr/>
+          <p:nvPr/>
+        </p:nvSpPr>
+        <p:spPr>
+          <a:xfrm>
+            <a:off x="4729776" y="3746142"/>
+            <a:ext cx="847437" cy="174110"/>
+          </a:xfrm>
+          <a:prstGeom prst="rect">
+            <a:avLst/>
+          </a:prstGeom>
+          <a:ln>
+            <a:solidFill>
+              <a:schemeClr val="bg1"/>
+            </a:solidFill>
+          </a:ln>
+        </p:spPr>
+        <p:style>
+          <a:lnRef idx="2">
+            <a:schemeClr val="accent6"/>
+          </a:lnRef>
+          <a:fillRef idx="1">
+            <a:schemeClr val="lt1"/>
+          </a:fillRef>
+          <a:effectRef idx="0">
+            <a:schemeClr val="accent6"/>
+          </a:effectRef>
+          <a:fontRef idx="minor">
+            <a:schemeClr val="dk1"/>
+          </a:fontRef>
+        </p:style>
+        <p:txBody>
+          <a:bodyPr rtlCol="0" anchor="ctr"/>
+          <a:lstStyle/>
+          <a:p>
+            <a:pPr algn="ctr"/>
+            <a:endParaRPr lang="en-US"/>
+          </a:p>
+        </p:txBody>
+      </p:sp>
+      <p:sp>
+        <p:nvSpPr>
+          <p:cNvPr id="42" name="Isosceles Triangle 39">
+            <a:extLst>
+              <a:ext uri="{FF2B5EF4-FFF2-40B4-BE49-F238E27FC236}">
+                <a16:creationId xmlns:a16="http://schemas.microsoft.com/office/drawing/2014/main" id="{DA52B8F0-EA12-664B-8967-DD6A3573AC09}"/>
+              </a:ext>
+            </a:extLst>
+          </p:cNvPr>
+          <p:cNvSpPr/>
+          <p:nvPr/>
+        </p:nvSpPr>
+        <p:spPr>
+          <a:xfrm rot="5400000">
+            <a:off x="5368230" y="3833116"/>
+            <a:ext cx="209543" cy="208423"/>
+          </a:xfrm>
+          <a:prstGeom prst="triangle">
+            <a:avLst/>
+          </a:prstGeom>
+        </p:spPr>
+        <p:style>
+          <a:lnRef idx="2">
+            <a:schemeClr val="accent1">
+              <a:shade val="50000"/>
+            </a:schemeClr>
+          </a:lnRef>
+          <a:fillRef idx="1">
+            <a:schemeClr val="accent1"/>
+          </a:fillRef>
+          <a:effectRef idx="0">
+            <a:schemeClr val="accent1"/>
+          </a:effectRef>
+          <a:fontRef idx="minor">
+            <a:schemeClr val="lt1"/>
+          </a:fontRef>
+        </p:style>
+        <p:txBody>
+          <a:bodyPr rtlCol="0" anchor="ctr"/>
+          <a:lstStyle/>
+          <a:p>
+            <a:pPr algn="ctr"/>
+            <a:endParaRPr lang="en-US"/>
+          </a:p>
+        </p:txBody>
+      </p:sp>
+      <p:cxnSp>
+        <p:nvCxnSpPr>
+          <p:cNvPr id="53" name="Straight Arrow Connector 246">
+            <a:extLst>
+              <a:ext uri="{FF2B5EF4-FFF2-40B4-BE49-F238E27FC236}">
+                <a16:creationId xmlns:a16="http://schemas.microsoft.com/office/drawing/2014/main" id="{16D65A30-2B60-C74F-A747-6A970D94BDF7}"/>
               </a:ext>
             </a:extLst>
           </p:cNvPr>
@@ -21667,13 +22414,13 @@
         </p:nvCxnSpPr>
         <p:spPr>
           <a:xfrm rot="16200000" flipH="1">
-            <a:off x="3875314" y="2972038"/>
-            <a:ext cx="615430" cy="1013448"/>
+            <a:off x="4264380" y="2582971"/>
+            <a:ext cx="615431" cy="1791582"/>
           </a:xfrm>
           <a:prstGeom prst="bentConnector4">
             <a:avLst>
               <a:gd name="adj1" fmla="val -37145"/>
-              <a:gd name="adj2" fmla="val 99972"/>
+              <a:gd name="adj2" fmla="val 100036"/>
             </a:avLst>
           </a:prstGeom>
           <a:ln w="25400">
@@ -21700,10 +22447,104 @@
       </p:cxnSp>
       <p:sp>
         <p:nvSpPr>
-          <p:cNvPr id="52" name="TextBox 51">
-            <a:extLst>
-              <a:ext uri="{FF2B5EF4-FFF2-40B4-BE49-F238E27FC236}">
-                <a16:creationId xmlns:a16="http://schemas.microsoft.com/office/drawing/2014/main" id="{E3AFB12C-3DB7-CA4D-AA74-8F143FFCDD27}"/>
+          <p:cNvPr id="41" name="Isosceles Triangle 38">
+            <a:extLst>
+              <a:ext uri="{FF2B5EF4-FFF2-40B4-BE49-F238E27FC236}">
+                <a16:creationId xmlns:a16="http://schemas.microsoft.com/office/drawing/2014/main" id="{B856E018-378F-D144-82EA-BC46341585E8}"/>
+              </a:ext>
+            </a:extLst>
+          </p:cNvPr>
+          <p:cNvSpPr/>
+          <p:nvPr/>
+        </p:nvSpPr>
+        <p:spPr>
+          <a:xfrm rot="5400000">
+            <a:off x="4729216" y="3838370"/>
+            <a:ext cx="209543" cy="208423"/>
+          </a:xfrm>
+          <a:prstGeom prst="triangle">
+            <a:avLst/>
+          </a:prstGeom>
+        </p:spPr>
+        <p:style>
+          <a:lnRef idx="2">
+            <a:schemeClr val="accent1">
+              <a:shade val="50000"/>
+            </a:schemeClr>
+          </a:lnRef>
+          <a:fillRef idx="1">
+            <a:schemeClr val="accent1"/>
+          </a:fillRef>
+          <a:effectRef idx="0">
+            <a:schemeClr val="accent1"/>
+          </a:effectRef>
+          <a:fontRef idx="minor">
+            <a:schemeClr val="lt1"/>
+          </a:fontRef>
+        </p:style>
+        <p:txBody>
+          <a:bodyPr rtlCol="0" anchor="ctr"/>
+          <a:lstStyle/>
+          <a:p>
+            <a:pPr algn="ctr"/>
+            <a:endParaRPr lang="en-US"/>
+          </a:p>
+        </p:txBody>
+      </p:sp>
+      <p:cxnSp>
+        <p:nvCxnSpPr>
+          <p:cNvPr id="51" name="Straight Arrow Connector 246">
+            <a:extLst>
+              <a:ext uri="{FF2B5EF4-FFF2-40B4-BE49-F238E27FC236}">
+                <a16:creationId xmlns:a16="http://schemas.microsoft.com/office/drawing/2014/main" id="{E5C4213B-8B34-334D-BFD5-CF21DA0720D2}"/>
+              </a:ext>
+            </a:extLst>
+          </p:cNvPr>
+          <p:cNvCxnSpPr>
+            <a:cxnSpLocks/>
+            <a:stCxn id="18" idx="0"/>
+          </p:cNvCxnSpPr>
+          <p:nvPr/>
+        </p:nvCxnSpPr>
+        <p:spPr>
+          <a:xfrm rot="16200000" flipH="1">
+            <a:off x="3939514" y="2907837"/>
+            <a:ext cx="615431" cy="1141850"/>
+          </a:xfrm>
+          <a:prstGeom prst="bentConnector4">
+            <a:avLst>
+              <a:gd name="adj1" fmla="val -37145"/>
+              <a:gd name="adj2" fmla="val 100223"/>
+            </a:avLst>
+          </a:prstGeom>
+          <a:ln w="25400">
+            <a:solidFill>
+              <a:schemeClr val="accent5"/>
+            </a:solidFill>
+            <a:tailEnd type="diamond" w="lg" len="lg"/>
+          </a:ln>
+        </p:spPr>
+        <p:style>
+          <a:lnRef idx="1">
+            <a:schemeClr val="accent3"/>
+          </a:lnRef>
+          <a:fillRef idx="0">
+            <a:schemeClr val="accent3"/>
+          </a:fillRef>
+          <a:effectRef idx="0">
+            <a:schemeClr val="accent3"/>
+          </a:effectRef>
+          <a:fontRef idx="minor">
+            <a:schemeClr val="tx1"/>
+          </a:fontRef>
+        </p:style>
+      </p:cxnSp>
+      <p:sp>
+        <p:nvSpPr>
+          <p:cNvPr id="75" name="TextBox 74">
+            <a:extLst>
+              <a:ext uri="{FF2B5EF4-FFF2-40B4-BE49-F238E27FC236}">
+                <a16:creationId xmlns:a16="http://schemas.microsoft.com/office/drawing/2014/main" id="{A745AA63-4FBB-1B4F-A0BC-42B3527379E8}"/>
               </a:ext>
             </a:extLst>
           </p:cNvPr>
@@ -21712,7 +22553,7 @@
         </p:nvSpPr>
         <p:spPr>
           <a:xfrm>
-            <a:off x="4695461" y="3665066"/>
+            <a:off x="4823864" y="3665066"/>
             <a:ext cx="627095" cy="369332"/>
           </a:xfrm>
           <a:prstGeom prst="rect">
@@ -21766,565 +22607,6 @@
           </a:p>
         </p:txBody>
       </p:sp>
-      <p:cxnSp>
-        <p:nvCxnSpPr>
-          <p:cNvPr id="53" name="Straight Arrow Connector 246">
-            <a:extLst>
-              <a:ext uri="{FF2B5EF4-FFF2-40B4-BE49-F238E27FC236}">
-                <a16:creationId xmlns:a16="http://schemas.microsoft.com/office/drawing/2014/main" id="{16D65A30-2B60-C74F-A747-6A970D94BDF7}"/>
-              </a:ext>
-            </a:extLst>
-          </p:cNvPr>
-          <p:cNvCxnSpPr>
-            <a:cxnSpLocks/>
-            <a:stCxn id="18" idx="0"/>
-          </p:cNvCxnSpPr>
-          <p:nvPr/>
-        </p:nvCxnSpPr>
-        <p:spPr>
-          <a:xfrm rot="16200000" flipH="1">
-            <a:off x="4200180" y="2647172"/>
-            <a:ext cx="615430" cy="1663180"/>
-          </a:xfrm>
-          <a:prstGeom prst="bentConnector4">
-            <a:avLst>
-              <a:gd name="adj1" fmla="val -37145"/>
-              <a:gd name="adj2" fmla="val 100035"/>
-            </a:avLst>
-          </a:prstGeom>
-          <a:ln w="25400">
-            <a:solidFill>
-              <a:schemeClr val="accent5"/>
-            </a:solidFill>
-            <a:tailEnd type="diamond" w="lg" len="lg"/>
-          </a:ln>
-        </p:spPr>
-        <p:style>
-          <a:lnRef idx="1">
-            <a:schemeClr val="accent3"/>
-          </a:lnRef>
-          <a:fillRef idx="0">
-            <a:schemeClr val="accent3"/>
-          </a:fillRef>
-          <a:effectRef idx="0">
-            <a:schemeClr val="accent3"/>
-          </a:effectRef>
-          <a:fontRef idx="minor">
-            <a:schemeClr val="tx1"/>
-          </a:fontRef>
-        </p:style>
-      </p:cxnSp>
-      <p:cxnSp>
-        <p:nvCxnSpPr>
-          <p:cNvPr id="54" name="Elbow Connector 53">
-            <a:extLst>
-              <a:ext uri="{FF2B5EF4-FFF2-40B4-BE49-F238E27FC236}">
-                <a16:creationId xmlns:a16="http://schemas.microsoft.com/office/drawing/2014/main" id="{6D04C903-C975-0648-AAB9-4ED36891E23B}"/>
-              </a:ext>
-            </a:extLst>
-          </p:cNvPr>
-          <p:cNvCxnSpPr>
-            <a:cxnSpLocks/>
-          </p:cNvCxnSpPr>
-          <p:nvPr/>
-        </p:nvCxnSpPr>
-        <p:spPr>
-          <a:xfrm>
-            <a:off x="7990089" y="2282971"/>
-            <a:ext cx="422391" cy="1274100"/>
-          </a:xfrm>
-          <a:prstGeom prst="bentConnector2">
-            <a:avLst/>
-          </a:prstGeom>
-          <a:ln w="25400">
-            <a:solidFill>
-              <a:srgbClr val="7030A0"/>
-            </a:solidFill>
-            <a:tailEnd type="diamond" w="lg" len="lg"/>
-          </a:ln>
-        </p:spPr>
-        <p:style>
-          <a:lnRef idx="1">
-            <a:schemeClr val="accent3"/>
-          </a:lnRef>
-          <a:fillRef idx="0">
-            <a:schemeClr val="accent3"/>
-          </a:fillRef>
-          <a:effectRef idx="0">
-            <a:schemeClr val="accent3"/>
-          </a:effectRef>
-          <a:fontRef idx="minor">
-            <a:schemeClr val="tx1"/>
-          </a:fontRef>
-        </p:style>
-      </p:cxnSp>
-      <p:cxnSp>
-        <p:nvCxnSpPr>
-          <p:cNvPr id="55" name="Straight Connector 54">
-            <a:extLst>
-              <a:ext uri="{FF2B5EF4-FFF2-40B4-BE49-F238E27FC236}">
-                <a16:creationId xmlns:a16="http://schemas.microsoft.com/office/drawing/2014/main" id="{6B67F427-58B5-EF48-A516-8BD8C0D3DA5E}"/>
-              </a:ext>
-            </a:extLst>
-          </p:cNvPr>
-          <p:cNvCxnSpPr/>
-          <p:nvPr/>
-        </p:nvCxnSpPr>
-        <p:spPr>
-          <a:xfrm>
-            <a:off x="7812734" y="2559053"/>
-            <a:ext cx="0" cy="1837944"/>
-          </a:xfrm>
-          <a:prstGeom prst="line">
-            <a:avLst/>
-          </a:prstGeom>
-          <a:ln w="25400">
-            <a:solidFill>
-              <a:srgbClr val="C00000"/>
-            </a:solidFill>
-          </a:ln>
-        </p:spPr>
-        <p:style>
-          <a:lnRef idx="1">
-            <a:schemeClr val="accent3"/>
-          </a:lnRef>
-          <a:fillRef idx="0">
-            <a:schemeClr val="accent3"/>
-          </a:fillRef>
-          <a:effectRef idx="0">
-            <a:schemeClr val="accent3"/>
-          </a:effectRef>
-          <a:fontRef idx="minor">
-            <a:schemeClr val="tx1"/>
-          </a:fontRef>
-        </p:style>
-      </p:cxnSp>
-      <p:sp>
-        <p:nvSpPr>
-          <p:cNvPr id="56" name="Freeform 55">
-            <a:extLst>
-              <a:ext uri="{FF2B5EF4-FFF2-40B4-BE49-F238E27FC236}">
-                <a16:creationId xmlns:a16="http://schemas.microsoft.com/office/drawing/2014/main" id="{1442DEA8-EBE8-6F49-B704-A20C00605CE2}"/>
-              </a:ext>
-            </a:extLst>
-          </p:cNvPr>
-          <p:cNvSpPr/>
-          <p:nvPr/>
-        </p:nvSpPr>
-        <p:spPr>
-          <a:xfrm>
-            <a:off x="7966400" y="3655788"/>
-            <a:ext cx="868442" cy="180707"/>
-          </a:xfrm>
-          <a:custGeom>
-            <a:avLst/>
-            <a:gdLst>
-              <a:gd name="connsiteX0" fmla="*/ 0 w 4142629"/>
-              <a:gd name="connsiteY0" fmla="*/ 854057 h 862008"/>
-              <a:gd name="connsiteX1" fmla="*/ 1470991 w 4142629"/>
-              <a:gd name="connsiteY1" fmla="*/ 691055 h 862008"/>
-              <a:gd name="connsiteX2" fmla="*/ 174928 w 4142629"/>
-              <a:gd name="connsiteY2" fmla="*/ 301441 h 862008"/>
-              <a:gd name="connsiteX3" fmla="*/ 1411356 w 4142629"/>
-              <a:gd name="connsiteY3" fmla="*/ 35072 h 862008"/>
-              <a:gd name="connsiteX4" fmla="*/ 2747175 w 4142629"/>
-              <a:gd name="connsiteY4" fmla="*/ 31097 h 862008"/>
-              <a:gd name="connsiteX5" fmla="*/ 3951798 w 4142629"/>
-              <a:gd name="connsiteY5" fmla="*/ 293490 h 862008"/>
-              <a:gd name="connsiteX6" fmla="*/ 2671638 w 4142629"/>
-              <a:gd name="connsiteY6" fmla="*/ 675152 h 862008"/>
-              <a:gd name="connsiteX7" fmla="*/ 4142629 w 4142629"/>
-              <a:gd name="connsiteY7" fmla="*/ 862008 h 862008"/>
-            </a:gdLst>
-            <a:ahLst/>
-            <a:cxnLst>
-              <a:cxn ang="0">
-                <a:pos x="connsiteX0" y="connsiteY0"/>
-              </a:cxn>
-              <a:cxn ang="0">
-                <a:pos x="connsiteX1" y="connsiteY1"/>
-              </a:cxn>
-              <a:cxn ang="0">
-                <a:pos x="connsiteX2" y="connsiteY2"/>
-              </a:cxn>
-              <a:cxn ang="0">
-                <a:pos x="connsiteX3" y="connsiteY3"/>
-              </a:cxn>
-              <a:cxn ang="0">
-                <a:pos x="connsiteX4" y="connsiteY4"/>
-              </a:cxn>
-              <a:cxn ang="0">
-                <a:pos x="connsiteX5" y="connsiteY5"/>
-              </a:cxn>
-              <a:cxn ang="0">
-                <a:pos x="connsiteX6" y="connsiteY6"/>
-              </a:cxn>
-              <a:cxn ang="0">
-                <a:pos x="connsiteX7" y="connsiteY7"/>
-              </a:cxn>
-            </a:cxnLst>
-            <a:rect l="l" t="t" r="r" b="b"/>
-            <a:pathLst>
-              <a:path w="4142629" h="862008">
-                <a:moveTo>
-                  <a:pt x="0" y="854057"/>
-                </a:moveTo>
-                <a:cubicBezTo>
-                  <a:pt x="720918" y="818607"/>
-                  <a:pt x="1441836" y="783158"/>
-                  <a:pt x="1470991" y="691055"/>
-                </a:cubicBezTo>
-                <a:cubicBezTo>
-                  <a:pt x="1500146" y="598952"/>
-                  <a:pt x="184867" y="410771"/>
-                  <a:pt x="174928" y="301441"/>
-                </a:cubicBezTo>
-                <a:cubicBezTo>
-                  <a:pt x="164989" y="192111"/>
-                  <a:pt x="982648" y="80129"/>
-                  <a:pt x="1411356" y="35072"/>
-                </a:cubicBezTo>
-                <a:cubicBezTo>
-                  <a:pt x="1840064" y="-9985"/>
-                  <a:pt x="2323768" y="-11973"/>
-                  <a:pt x="2747175" y="31097"/>
-                </a:cubicBezTo>
-                <a:cubicBezTo>
-                  <a:pt x="3170582" y="74167"/>
-                  <a:pt x="3964387" y="186148"/>
-                  <a:pt x="3951798" y="293490"/>
-                </a:cubicBezTo>
-                <a:cubicBezTo>
-                  <a:pt x="3939209" y="400832"/>
-                  <a:pt x="2639833" y="580399"/>
-                  <a:pt x="2671638" y="675152"/>
-                </a:cubicBezTo>
-                <a:cubicBezTo>
-                  <a:pt x="2703443" y="769905"/>
-                  <a:pt x="3423036" y="815956"/>
-                  <a:pt x="4142629" y="862008"/>
-                </a:cubicBezTo>
-              </a:path>
-            </a:pathLst>
-          </a:custGeom>
-          <a:ln w="28575"/>
-        </p:spPr>
-        <p:style>
-          <a:lnRef idx="1">
-            <a:schemeClr val="dk1"/>
-          </a:lnRef>
-          <a:fillRef idx="0">
-            <a:schemeClr val="dk1"/>
-          </a:fillRef>
-          <a:effectRef idx="0">
-            <a:schemeClr val="dk1"/>
-          </a:effectRef>
-          <a:fontRef idx="minor">
-            <a:schemeClr val="tx1"/>
-          </a:fontRef>
-        </p:style>
-        <p:txBody>
-          <a:bodyPr rtlCol="0" anchor="ctr"/>
-          <a:lstStyle/>
-          <a:p>
-            <a:pPr algn="ctr"/>
-            <a:endParaRPr lang="en-US"/>
-          </a:p>
-        </p:txBody>
-      </p:sp>
-      <p:sp>
-        <p:nvSpPr>
-          <p:cNvPr id="57" name="TextBox 56">
-            <a:extLst>
-              <a:ext uri="{FF2B5EF4-FFF2-40B4-BE49-F238E27FC236}">
-                <a16:creationId xmlns:a16="http://schemas.microsoft.com/office/drawing/2014/main" id="{145499E7-A5DC-1A4C-9E97-79FE003DC539}"/>
-              </a:ext>
-            </a:extLst>
-          </p:cNvPr>
-          <p:cNvSpPr txBox="1"/>
-          <p:nvPr/>
-        </p:nvSpPr>
-        <p:spPr>
-          <a:xfrm>
-            <a:off x="7919359" y="3804739"/>
-            <a:ext cx="985847" cy="646331"/>
-          </a:xfrm>
-          <a:prstGeom prst="rect">
-            <a:avLst/>
-          </a:prstGeom>
-          <a:noFill/>
-        </p:spPr>
-        <p:txBody>
-          <a:bodyPr wrap="none" rtlCol="0">
-            <a:spAutoFit/>
-          </a:bodyPr>
-          <a:lstStyle/>
-          <a:p>
-            <a:pPr algn="ctr"/>
-            <a:r>
-              <a:rPr lang="en-US" dirty="0"/>
-              <a:t>genomic</a:t>
-            </a:r>
-          </a:p>
-          <a:p>
-            <a:pPr algn="ctr"/>
-            <a:r>
-              <a:rPr lang="en-US" dirty="0"/>
-              <a:t>target</a:t>
-            </a:r>
-          </a:p>
-        </p:txBody>
-      </p:sp>
-      <p:cxnSp>
-        <p:nvCxnSpPr>
-          <p:cNvPr id="58" name="Straight Arrow Connector 57">
-            <a:extLst>
-              <a:ext uri="{FF2B5EF4-FFF2-40B4-BE49-F238E27FC236}">
-                <a16:creationId xmlns:a16="http://schemas.microsoft.com/office/drawing/2014/main" id="{86974366-DB81-1545-B144-7D769EE7AF95}"/>
-              </a:ext>
-            </a:extLst>
-          </p:cNvPr>
-          <p:cNvCxnSpPr>
-            <a:cxnSpLocks/>
-          </p:cNvCxnSpPr>
-          <p:nvPr/>
-        </p:nvCxnSpPr>
-        <p:spPr>
-          <a:xfrm flipV="1">
-            <a:off x="2667520" y="3434976"/>
-            <a:ext cx="0" cy="365760"/>
-          </a:xfrm>
-          <a:prstGeom prst="straightConnector1">
-            <a:avLst/>
-          </a:prstGeom>
-          <a:ln w="25400">
-            <a:tailEnd type="triangle" w="lg" len="lg"/>
-          </a:ln>
-        </p:spPr>
-        <p:style>
-          <a:lnRef idx="1">
-            <a:schemeClr val="accent3"/>
-          </a:lnRef>
-          <a:fillRef idx="0">
-            <a:schemeClr val="accent3"/>
-          </a:fillRef>
-          <a:effectRef idx="0">
-            <a:schemeClr val="accent3"/>
-          </a:effectRef>
-          <a:fontRef idx="minor">
-            <a:schemeClr val="tx1"/>
-          </a:fontRef>
-        </p:style>
-      </p:cxnSp>
-      <p:sp>
-        <p:nvSpPr>
-          <p:cNvPr id="59" name="Pentagon 58">
-            <a:extLst>
-              <a:ext uri="{FF2B5EF4-FFF2-40B4-BE49-F238E27FC236}">
-                <a16:creationId xmlns:a16="http://schemas.microsoft.com/office/drawing/2014/main" id="{A99B08E0-665C-D846-849C-F5AE58F70CC8}"/>
-              </a:ext>
-            </a:extLst>
-          </p:cNvPr>
-          <p:cNvSpPr/>
-          <p:nvPr/>
-        </p:nvSpPr>
-        <p:spPr>
-          <a:xfrm>
-            <a:off x="2320863" y="3774296"/>
-            <a:ext cx="773535" cy="326065"/>
-          </a:xfrm>
-          <a:prstGeom prst="homePlate">
-            <a:avLst/>
-          </a:prstGeom>
-          <a:solidFill>
-            <a:schemeClr val="accent6">
-              <a:lumMod val="60000"/>
-              <a:lumOff val="40000"/>
-            </a:schemeClr>
-          </a:solidFill>
-        </p:spPr>
-        <p:style>
-          <a:lnRef idx="2">
-            <a:schemeClr val="accent6">
-              <a:shade val="50000"/>
-            </a:schemeClr>
-          </a:lnRef>
-          <a:fillRef idx="1">
-            <a:schemeClr val="accent6"/>
-          </a:fillRef>
-          <a:effectRef idx="0">
-            <a:schemeClr val="accent6"/>
-          </a:effectRef>
-          <a:fontRef idx="minor">
-            <a:schemeClr val="lt1"/>
-          </a:fontRef>
-        </p:style>
-        <p:txBody>
-          <a:bodyPr rtlCol="0" anchor="ctr"/>
-          <a:lstStyle/>
-          <a:p>
-            <a:pPr algn="ctr"/>
-            <a:r>
-              <a:rPr lang="en-US" dirty="0">
-                <a:solidFill>
-                  <a:schemeClr val="tx1"/>
-                </a:solidFill>
-              </a:rPr>
-              <a:t>TF-A</a:t>
-            </a:r>
-          </a:p>
-        </p:txBody>
-      </p:sp>
-      <p:sp>
-        <p:nvSpPr>
-          <p:cNvPr id="60" name="Rounded Rectangle 59">
-            <a:extLst>
-              <a:ext uri="{FF2B5EF4-FFF2-40B4-BE49-F238E27FC236}">
-                <a16:creationId xmlns:a16="http://schemas.microsoft.com/office/drawing/2014/main" id="{AF2FC26E-771F-D14A-934F-A62A2DB82E8F}"/>
-              </a:ext>
-            </a:extLst>
-          </p:cNvPr>
-          <p:cNvSpPr/>
-          <p:nvPr/>
-        </p:nvSpPr>
-        <p:spPr>
-          <a:xfrm>
-            <a:off x="2361037" y="3171047"/>
-            <a:ext cx="612967" cy="255371"/>
-          </a:xfrm>
-          <a:prstGeom prst="roundRect">
-            <a:avLst>
-              <a:gd name="adj" fmla="val 50000"/>
-            </a:avLst>
-          </a:prstGeom>
-          <a:solidFill>
-            <a:schemeClr val="accent6">
-              <a:lumMod val="60000"/>
-              <a:lumOff val="40000"/>
-            </a:schemeClr>
-          </a:solidFill>
-        </p:spPr>
-        <p:style>
-          <a:lnRef idx="2">
-            <a:schemeClr val="accent6">
-              <a:shade val="50000"/>
-            </a:schemeClr>
-          </a:lnRef>
-          <a:fillRef idx="1">
-            <a:schemeClr val="accent6"/>
-          </a:fillRef>
-          <a:effectRef idx="0">
-            <a:schemeClr val="accent6"/>
-          </a:effectRef>
-          <a:fontRef idx="minor">
-            <a:schemeClr val="lt1"/>
-          </a:fontRef>
-        </p:style>
-        <p:txBody>
-          <a:bodyPr wrap="none" rtlCol="0" anchor="ctr"/>
-          <a:lstStyle/>
-          <a:p>
-            <a:pPr algn="ctr"/>
-            <a:endParaRPr lang="en-US" dirty="0">
-              <a:solidFill>
-                <a:schemeClr val="tx1"/>
-              </a:solidFill>
-            </a:endParaRPr>
-          </a:p>
-        </p:txBody>
-      </p:sp>
-      <p:cxnSp>
-        <p:nvCxnSpPr>
-          <p:cNvPr id="61" name="Elbow Connector 60">
-            <a:extLst>
-              <a:ext uri="{FF2B5EF4-FFF2-40B4-BE49-F238E27FC236}">
-                <a16:creationId xmlns:a16="http://schemas.microsoft.com/office/drawing/2014/main" id="{32E15424-F008-3D48-84FA-A22AF5A613B4}"/>
-              </a:ext>
-            </a:extLst>
-          </p:cNvPr>
-          <p:cNvCxnSpPr>
-            <a:cxnSpLocks/>
-          </p:cNvCxnSpPr>
-          <p:nvPr/>
-        </p:nvCxnSpPr>
-        <p:spPr>
-          <a:xfrm flipV="1">
-            <a:off x="2160273" y="3631204"/>
-            <a:ext cx="328764" cy="301158"/>
-          </a:xfrm>
-          <a:prstGeom prst="bentConnector3">
-            <a:avLst>
-              <a:gd name="adj1" fmla="val 2567"/>
-            </a:avLst>
-          </a:prstGeom>
-          <a:ln w="38100">
-            <a:headEnd type="none" w="med" len="med"/>
-            <a:tailEnd type="arrow" w="med" len="med"/>
-          </a:ln>
-        </p:spPr>
-        <p:style>
-          <a:lnRef idx="3">
-            <a:schemeClr val="dk1"/>
-          </a:lnRef>
-          <a:fillRef idx="0">
-            <a:schemeClr val="dk1"/>
-          </a:fillRef>
-          <a:effectRef idx="2">
-            <a:schemeClr val="dk1"/>
-          </a:effectRef>
-          <a:fontRef idx="minor">
-            <a:schemeClr val="tx1"/>
-          </a:fontRef>
-        </p:style>
-      </p:cxnSp>
-      <p:cxnSp>
-        <p:nvCxnSpPr>
-          <p:cNvPr id="62" name="Straight Arrow Connector 246">
-            <a:extLst>
-              <a:ext uri="{FF2B5EF4-FFF2-40B4-BE49-F238E27FC236}">
-                <a16:creationId xmlns:a16="http://schemas.microsoft.com/office/drawing/2014/main" id="{0BD087FC-5771-BF43-A34B-54D5AC5319C4}"/>
-              </a:ext>
-            </a:extLst>
-          </p:cNvPr>
-          <p:cNvCxnSpPr>
-            <a:cxnSpLocks/>
-            <a:stCxn id="60" idx="0"/>
-          </p:cNvCxnSpPr>
-          <p:nvPr/>
-        </p:nvCxnSpPr>
-        <p:spPr>
-          <a:xfrm rot="16200000" flipH="1">
-            <a:off x="2755377" y="3083191"/>
-            <a:ext cx="394678" cy="570390"/>
-          </a:xfrm>
-          <a:prstGeom prst="bentConnector4">
-            <a:avLst>
-              <a:gd name="adj1" fmla="val -57921"/>
-              <a:gd name="adj2" fmla="val 99877"/>
-            </a:avLst>
-          </a:prstGeom>
-          <a:ln w="25400">
-            <a:solidFill>
-              <a:schemeClr val="accent6"/>
-            </a:solidFill>
-            <a:tailEnd type="triangle" w="lg" len="lg"/>
-          </a:ln>
-        </p:spPr>
-        <p:style>
-          <a:lnRef idx="1">
-            <a:schemeClr val="accent3"/>
-          </a:lnRef>
-          <a:fillRef idx="0">
-            <a:schemeClr val="accent3"/>
-          </a:fillRef>
-          <a:effectRef idx="0">
-            <a:schemeClr val="accent3"/>
-          </a:effectRef>
-          <a:fontRef idx="minor">
-            <a:schemeClr val="tx1"/>
-          </a:fontRef>
-        </p:style>
-      </p:cxnSp>
     </p:spTree>
     <p:extLst>
       <p:ext uri="{BB962C8B-B14F-4D97-AF65-F5344CB8AC3E}">

</xml_diff>